<commit_message>
Added extractor structure figure
</commit_message>
<xml_diff>
--- a/docs/figures/Architecture.pptx
+++ b/docs/figures/Architecture.pptx
@@ -6065,10 +6065,54 @@
         </p:nvSpPr>
         <p:spPr>
           <a:xfrm>
-            <a:off x="4212492" y="3262923"/>
+            <a:off x="3040187" y="3255108"/>
             <a:ext cx="953477" cy="863600"/>
           </a:xfrm>
           <a:prstGeom prst="flowChartMultidocument">
+            <a:avLst/>
+          </a:prstGeom>
+        </p:spPr>
+        <p:style>
+          <a:lnRef idx="2">
+            <a:schemeClr val="accent1"/>
+          </a:lnRef>
+          <a:fillRef idx="1">
+            <a:schemeClr val="lt1"/>
+          </a:fillRef>
+          <a:effectRef idx="0">
+            <a:schemeClr val="accent1"/>
+          </a:effectRef>
+          <a:fontRef idx="minor">
+            <a:schemeClr val="dk1"/>
+          </a:fontRef>
+        </p:style>
+        <p:txBody>
+          <a:bodyPr rtlCol="0" anchor="ctr"/>
+          <a:lstStyle/>
+          <a:p>
+            <a:pPr algn="ctr"/>
+            <a:endParaRPr lang="en-US" dirty="0"/>
+          </a:p>
+        </p:txBody>
+      </p:sp>
+      <p:sp>
+        <p:nvSpPr>
+          <p:cNvPr id="11" name="Flowchart: Process 10">
+            <a:extLst>
+              <a:ext uri="{FF2B5EF4-FFF2-40B4-BE49-F238E27FC236}">
+                <a16:creationId xmlns:a16="http://schemas.microsoft.com/office/drawing/2014/main" id="{90D209FA-0160-4FC1-A7BC-93C826CD03A3}"/>
+              </a:ext>
+            </a:extLst>
+          </p:cNvPr>
+          <p:cNvSpPr/>
+          <p:nvPr/>
+        </p:nvSpPr>
+        <p:spPr>
+          <a:xfrm>
+            <a:off x="359506" y="3071447"/>
+            <a:ext cx="1641765" cy="1047261"/>
+          </a:xfrm>
+          <a:prstGeom prst="flowChartProcess">
             <a:avLst/>
           </a:prstGeom>
         </p:spPr>
@@ -6093,16 +6137,90 @@
           <a:lstStyle/>
           <a:p>
             <a:pPr algn="ctr"/>
-            <a:endParaRPr lang="en-US" dirty="0"/>
-          </a:p>
-        </p:txBody>
-      </p:sp>
-      <p:sp>
-        <p:nvSpPr>
-          <p:cNvPr id="11" name="Flowchart: Process 10">
-            <a:extLst>
-              <a:ext uri="{FF2B5EF4-FFF2-40B4-BE49-F238E27FC236}">
-                <a16:creationId xmlns:a16="http://schemas.microsoft.com/office/drawing/2014/main" id="{90D209FA-0160-4FC1-A7BC-93C826CD03A3}"/>
+            <a:r>
+              <a:rPr lang="en-US" sz="1400" dirty="0" err="1"/>
+              <a:t>VepFolderProcessor</a:t>
+            </a:r>
+            <a:endParaRPr lang="en-US" sz="1400" dirty="0"/>
+          </a:p>
+        </p:txBody>
+      </p:sp>
+      <p:sp>
+        <p:nvSpPr>
+          <p:cNvPr id="3" name="TextBox 2">
+            <a:extLst>
+              <a:ext uri="{FF2B5EF4-FFF2-40B4-BE49-F238E27FC236}">
+                <a16:creationId xmlns:a16="http://schemas.microsoft.com/office/drawing/2014/main" id="{FCB5CE05-CB84-4817-A86D-E2BA796D88D0}"/>
+              </a:ext>
+            </a:extLst>
+          </p:cNvPr>
+          <p:cNvSpPr txBox="1"/>
+          <p:nvPr/>
+        </p:nvSpPr>
+        <p:spPr>
+          <a:xfrm>
+            <a:off x="2743203" y="2702115"/>
+            <a:ext cx="1880130" cy="369332"/>
+          </a:xfrm>
+          <a:prstGeom prst="rect">
+            <a:avLst/>
+          </a:prstGeom>
+          <a:noFill/>
+        </p:spPr>
+        <p:txBody>
+          <a:bodyPr wrap="none" rtlCol="0">
+            <a:spAutoFit/>
+          </a:bodyPr>
+          <a:lstStyle/>
+          <a:p>
+            <a:r>
+              <a:rPr lang="en-US" dirty="0"/>
+              <a:t>Chromosome files</a:t>
+            </a:r>
+          </a:p>
+        </p:txBody>
+      </p:sp>
+      <p:sp>
+        <p:nvSpPr>
+          <p:cNvPr id="6" name="TextBox 5">
+            <a:extLst>
+              <a:ext uri="{FF2B5EF4-FFF2-40B4-BE49-F238E27FC236}">
+                <a16:creationId xmlns:a16="http://schemas.microsoft.com/office/drawing/2014/main" id="{E7CF983F-01DA-44B9-8CC1-1DE38538265F}"/>
+              </a:ext>
+            </a:extLst>
+          </p:cNvPr>
+          <p:cNvSpPr txBox="1"/>
+          <p:nvPr/>
+        </p:nvSpPr>
+        <p:spPr>
+          <a:xfrm>
+            <a:off x="2743203" y="4190946"/>
+            <a:ext cx="1721112" cy="369332"/>
+          </a:xfrm>
+          <a:prstGeom prst="rect">
+            <a:avLst/>
+          </a:prstGeom>
+          <a:noFill/>
+        </p:spPr>
+        <p:txBody>
+          <a:bodyPr wrap="none" rtlCol="0">
+            <a:spAutoFit/>
+          </a:bodyPr>
+          <a:lstStyle/>
+          <a:p>
+            <a:r>
+              <a:rPr lang="en-US" dirty="0"/>
+              <a:t>SNPs to proteins</a:t>
+            </a:r>
+          </a:p>
+        </p:txBody>
+      </p:sp>
+      <p:sp>
+        <p:nvSpPr>
+          <p:cNvPr id="7" name="Arrow: Right 6">
+            <a:extLst>
+              <a:ext uri="{FF2B5EF4-FFF2-40B4-BE49-F238E27FC236}">
+                <a16:creationId xmlns:a16="http://schemas.microsoft.com/office/drawing/2014/main" id="{F223BA4D-3DA6-4644-82F0-BBB0A57192C5}"/>
               </a:ext>
             </a:extLst>
           </p:cNvPr>
@@ -6111,7 +6229,99 @@
         </p:nvSpPr>
         <p:spPr>
           <a:xfrm>
-            <a:off x="1273906" y="3079262"/>
+            <a:off x="2254356" y="3450287"/>
+            <a:ext cx="529390" cy="473242"/>
+          </a:xfrm>
+          <a:prstGeom prst="rightArrow">
+            <a:avLst/>
+          </a:prstGeom>
+        </p:spPr>
+        <p:style>
+          <a:lnRef idx="2">
+            <a:schemeClr val="dk1">
+              <a:shade val="50000"/>
+            </a:schemeClr>
+          </a:lnRef>
+          <a:fillRef idx="1">
+            <a:schemeClr val="dk1"/>
+          </a:fillRef>
+          <a:effectRef idx="0">
+            <a:schemeClr val="dk1"/>
+          </a:effectRef>
+          <a:fontRef idx="minor">
+            <a:schemeClr val="lt1"/>
+          </a:fontRef>
+        </p:style>
+        <p:txBody>
+          <a:bodyPr rtlCol="0" anchor="ctr"/>
+          <a:lstStyle/>
+          <a:p>
+            <a:pPr algn="ctr"/>
+            <a:endParaRPr lang="en-GB"/>
+          </a:p>
+        </p:txBody>
+      </p:sp>
+      <p:sp>
+        <p:nvSpPr>
+          <p:cNvPr id="8" name="Arrow: Right 7">
+            <a:extLst>
+              <a:ext uri="{FF2B5EF4-FFF2-40B4-BE49-F238E27FC236}">
+                <a16:creationId xmlns:a16="http://schemas.microsoft.com/office/drawing/2014/main" id="{1324CA21-8EEC-4FBC-8BA2-7F352DC3831B}"/>
+              </a:ext>
+            </a:extLst>
+          </p:cNvPr>
+          <p:cNvSpPr/>
+          <p:nvPr/>
+        </p:nvSpPr>
+        <p:spPr>
+          <a:xfrm>
+            <a:off x="4376590" y="3421185"/>
+            <a:ext cx="529390" cy="473242"/>
+          </a:xfrm>
+          <a:prstGeom prst="rightArrow">
+            <a:avLst/>
+          </a:prstGeom>
+        </p:spPr>
+        <p:style>
+          <a:lnRef idx="2">
+            <a:schemeClr val="dk1">
+              <a:shade val="50000"/>
+            </a:schemeClr>
+          </a:lnRef>
+          <a:fillRef idx="1">
+            <a:schemeClr val="dk1"/>
+          </a:fillRef>
+          <a:effectRef idx="0">
+            <a:schemeClr val="dk1"/>
+          </a:effectRef>
+          <a:fontRef idx="minor">
+            <a:schemeClr val="lt1"/>
+          </a:fontRef>
+        </p:style>
+        <p:txBody>
+          <a:bodyPr rtlCol="0" anchor="ctr"/>
+          <a:lstStyle/>
+          <a:p>
+            <a:pPr algn="ctr"/>
+            <a:endParaRPr lang="en-GB"/>
+          </a:p>
+        </p:txBody>
+      </p:sp>
+      <p:sp>
+        <p:nvSpPr>
+          <p:cNvPr id="9" name="Flowchart: Process 8">
+            <a:extLst>
+              <a:ext uri="{FF2B5EF4-FFF2-40B4-BE49-F238E27FC236}">
+                <a16:creationId xmlns:a16="http://schemas.microsoft.com/office/drawing/2014/main" id="{710F84E9-DDD7-4C83-8AD5-F08C2E16A856}"/>
+              </a:ext>
+            </a:extLst>
+          </p:cNvPr>
+          <p:cNvSpPr/>
+          <p:nvPr/>
+        </p:nvSpPr>
+        <p:spPr>
+          <a:xfrm>
+            <a:off x="5159065" y="3071446"/>
             <a:ext cx="1703755" cy="1047261"/>
           </a:xfrm>
           <a:prstGeom prst="flowChartProcess">
@@ -6140,10 +6350,276 @@
           <a:p>
             <a:pPr algn="ctr"/>
             <a:r>
-              <a:rPr lang="en-US" sz="1400" dirty="0" err="1"/>
-              <a:t>VepFolderProcessor</a:t>
-            </a:r>
-            <a:endParaRPr lang="en-US" sz="1400" dirty="0"/>
+              <a:rPr lang="en-US" sz="1400" dirty="0"/>
+              <a:t>Extractor</a:t>
+            </a:r>
+          </a:p>
+        </p:txBody>
+      </p:sp>
+      <p:sp>
+        <p:nvSpPr>
+          <p:cNvPr id="12" name="Flowchart: Multidocument 11">
+            <a:extLst>
+              <a:ext uri="{FF2B5EF4-FFF2-40B4-BE49-F238E27FC236}">
+                <a16:creationId xmlns:a16="http://schemas.microsoft.com/office/drawing/2014/main" id="{B9B0E5CD-2BC2-442A-A1D3-520C877A689E}"/>
+              </a:ext>
+            </a:extLst>
+          </p:cNvPr>
+          <p:cNvSpPr/>
+          <p:nvPr/>
+        </p:nvSpPr>
+        <p:spPr>
+          <a:xfrm>
+            <a:off x="7901765" y="3235568"/>
+            <a:ext cx="953477" cy="863600"/>
+          </a:xfrm>
+          <a:prstGeom prst="flowChartMultidocument">
+            <a:avLst/>
+          </a:prstGeom>
+        </p:spPr>
+        <p:style>
+          <a:lnRef idx="2">
+            <a:schemeClr val="accent1"/>
+          </a:lnRef>
+          <a:fillRef idx="1">
+            <a:schemeClr val="lt1"/>
+          </a:fillRef>
+          <a:effectRef idx="0">
+            <a:schemeClr val="accent1"/>
+          </a:effectRef>
+          <a:fontRef idx="minor">
+            <a:schemeClr val="dk1"/>
+          </a:fontRef>
+        </p:style>
+        <p:txBody>
+          <a:bodyPr rtlCol="0" anchor="ctr"/>
+          <a:lstStyle/>
+          <a:p>
+            <a:pPr algn="ctr"/>
+            <a:endParaRPr lang="en-US" dirty="0"/>
+          </a:p>
+        </p:txBody>
+      </p:sp>
+      <p:sp>
+        <p:nvSpPr>
+          <p:cNvPr id="13" name="Arrow: Right 12">
+            <a:extLst>
+              <a:ext uri="{FF2B5EF4-FFF2-40B4-BE49-F238E27FC236}">
+                <a16:creationId xmlns:a16="http://schemas.microsoft.com/office/drawing/2014/main" id="{86B04365-94B5-4AD7-BC5E-8DEC4D64C79B}"/>
+              </a:ext>
+            </a:extLst>
+          </p:cNvPr>
+          <p:cNvSpPr/>
+          <p:nvPr/>
+        </p:nvSpPr>
+        <p:spPr>
+          <a:xfrm>
+            <a:off x="7133857" y="3421185"/>
+            <a:ext cx="529390" cy="473242"/>
+          </a:xfrm>
+          <a:prstGeom prst="rightArrow">
+            <a:avLst/>
+          </a:prstGeom>
+        </p:spPr>
+        <p:style>
+          <a:lnRef idx="2">
+            <a:schemeClr val="dk1">
+              <a:shade val="50000"/>
+            </a:schemeClr>
+          </a:lnRef>
+          <a:fillRef idx="1">
+            <a:schemeClr val="dk1"/>
+          </a:fillRef>
+          <a:effectRef idx="0">
+            <a:schemeClr val="dk1"/>
+          </a:effectRef>
+          <a:fontRef idx="minor">
+            <a:schemeClr val="lt1"/>
+          </a:fontRef>
+        </p:style>
+        <p:txBody>
+          <a:bodyPr rtlCol="0" anchor="ctr"/>
+          <a:lstStyle/>
+          <a:p>
+            <a:pPr algn="ctr"/>
+            <a:endParaRPr lang="en-GB"/>
+          </a:p>
+        </p:txBody>
+      </p:sp>
+      <p:sp>
+        <p:nvSpPr>
+          <p:cNvPr id="14" name="TextBox 13">
+            <a:extLst>
+              <a:ext uri="{FF2B5EF4-FFF2-40B4-BE49-F238E27FC236}">
+                <a16:creationId xmlns:a16="http://schemas.microsoft.com/office/drawing/2014/main" id="{DB129766-BDCF-457D-8486-30BF1F9372A4}"/>
+              </a:ext>
+            </a:extLst>
+          </p:cNvPr>
+          <p:cNvSpPr txBox="1"/>
+          <p:nvPr/>
+        </p:nvSpPr>
+        <p:spPr>
+          <a:xfrm>
+            <a:off x="7438438" y="2694299"/>
+            <a:ext cx="2010359" cy="369332"/>
+          </a:xfrm>
+          <a:prstGeom prst="rect">
+            <a:avLst/>
+          </a:prstGeom>
+          <a:noFill/>
+        </p:spPr>
+        <p:txBody>
+          <a:bodyPr wrap="none" rtlCol="0">
+            <a:spAutoFit/>
+          </a:bodyPr>
+          <a:lstStyle/>
+          <a:p>
+            <a:r>
+              <a:rPr lang="en-US" dirty="0"/>
+              <a:t>Static mapping files</a:t>
+            </a:r>
+          </a:p>
+        </p:txBody>
+      </p:sp>
+      <p:sp>
+        <p:nvSpPr>
+          <p:cNvPr id="15" name="TextBox 14">
+            <a:extLst>
+              <a:ext uri="{FF2B5EF4-FFF2-40B4-BE49-F238E27FC236}">
+                <a16:creationId xmlns:a16="http://schemas.microsoft.com/office/drawing/2014/main" id="{9B0F2AE3-283F-4905-9A85-E3A481C26F20}"/>
+              </a:ext>
+            </a:extLst>
+          </p:cNvPr>
+          <p:cNvSpPr txBox="1"/>
+          <p:nvPr/>
+        </p:nvSpPr>
+        <p:spPr>
+          <a:xfrm>
+            <a:off x="7766124" y="4187593"/>
+            <a:ext cx="1354986" cy="923330"/>
+          </a:xfrm>
+          <a:prstGeom prst="rect">
+            <a:avLst/>
+          </a:prstGeom>
+          <a:noFill/>
+        </p:spPr>
+        <p:txBody>
+          <a:bodyPr wrap="none" rtlCol="0">
+            <a:spAutoFit/>
+          </a:bodyPr>
+          <a:lstStyle/>
+          <a:p>
+            <a:r>
+              <a:rPr lang="en-US" dirty="0"/>
+              <a:t>Proteoforms</a:t>
+            </a:r>
+          </a:p>
+          <a:p>
+            <a:r>
+              <a:rPr lang="en-US" dirty="0"/>
+              <a:t>Reactions</a:t>
+            </a:r>
+          </a:p>
+          <a:p>
+            <a:r>
+              <a:rPr lang="en-US" dirty="0"/>
+              <a:t>Pathways…</a:t>
+            </a:r>
+          </a:p>
+        </p:txBody>
+      </p:sp>
+      <p:sp>
+        <p:nvSpPr>
+          <p:cNvPr id="16" name="Arrow: Right 15">
+            <a:extLst>
+              <a:ext uri="{FF2B5EF4-FFF2-40B4-BE49-F238E27FC236}">
+                <a16:creationId xmlns:a16="http://schemas.microsoft.com/office/drawing/2014/main" id="{0F0D74B3-E5D7-4116-A37C-71504E75EA43}"/>
+              </a:ext>
+            </a:extLst>
+          </p:cNvPr>
+          <p:cNvSpPr/>
+          <p:nvPr/>
+        </p:nvSpPr>
+        <p:spPr>
+          <a:xfrm>
+            <a:off x="9348577" y="3388991"/>
+            <a:ext cx="529390" cy="473242"/>
+          </a:xfrm>
+          <a:prstGeom prst="rightArrow">
+            <a:avLst/>
+          </a:prstGeom>
+        </p:spPr>
+        <p:style>
+          <a:lnRef idx="2">
+            <a:schemeClr val="dk1">
+              <a:shade val="50000"/>
+            </a:schemeClr>
+          </a:lnRef>
+          <a:fillRef idx="1">
+            <a:schemeClr val="dk1"/>
+          </a:fillRef>
+          <a:effectRef idx="0">
+            <a:schemeClr val="dk1"/>
+          </a:effectRef>
+          <a:fontRef idx="minor">
+            <a:schemeClr val="lt1"/>
+          </a:fontRef>
+        </p:style>
+        <p:txBody>
+          <a:bodyPr rtlCol="0" anchor="ctr"/>
+          <a:lstStyle/>
+          <a:p>
+            <a:pPr algn="ctr"/>
+            <a:endParaRPr lang="en-GB"/>
+          </a:p>
+        </p:txBody>
+      </p:sp>
+      <p:sp>
+        <p:nvSpPr>
+          <p:cNvPr id="17" name="Flowchart: Process 16">
+            <a:extLst>
+              <a:ext uri="{FF2B5EF4-FFF2-40B4-BE49-F238E27FC236}">
+                <a16:creationId xmlns:a16="http://schemas.microsoft.com/office/drawing/2014/main" id="{1A0114C5-0A76-492A-874E-5495F94F3058}"/>
+              </a:ext>
+            </a:extLst>
+          </p:cNvPr>
+          <p:cNvSpPr/>
+          <p:nvPr/>
+        </p:nvSpPr>
+        <p:spPr>
+          <a:xfrm>
+            <a:off x="10133999" y="3101981"/>
+            <a:ext cx="1703755" cy="1047261"/>
+          </a:xfrm>
+          <a:prstGeom prst="flowChartProcess">
+            <a:avLst/>
+          </a:prstGeom>
+        </p:spPr>
+        <p:style>
+          <a:lnRef idx="2">
+            <a:schemeClr val="accent1">
+              <a:shade val="50000"/>
+            </a:schemeClr>
+          </a:lnRef>
+          <a:fillRef idx="1">
+            <a:schemeClr val="accent1"/>
+          </a:fillRef>
+          <a:effectRef idx="0">
+            <a:schemeClr val="accent1"/>
+          </a:effectRef>
+          <a:fontRef idx="minor">
+            <a:schemeClr val="lt1"/>
+          </a:fontRef>
+        </p:style>
+        <p:txBody>
+          <a:bodyPr rtlCol="0" anchor="ctr"/>
+          <a:lstStyle/>
+          <a:p>
+            <a:pPr algn="ctr"/>
+            <a:r>
+              <a:rPr lang="en-US" sz="1400" dirty="0"/>
+              <a:t>PathwayMatcher</a:t>
+            </a:r>
           </a:p>
         </p:txBody>
       </p:sp>

</xml_diff>

<commit_message>
Added overall structure diagram.
</commit_message>
<xml_diff>
--- a/docs/figures/Architecture.pptx
+++ b/docs/figures/Architecture.pptx
@@ -8,12 +8,12 @@
     <p:sldId id="256" r:id="rId2"/>
     <p:sldId id="257" r:id="rId3"/>
     <p:sldId id="259" r:id="rId4"/>
-    <p:sldId id="258" r:id="rId5"/>
-    <p:sldId id="260" r:id="rId6"/>
-    <p:sldId id="261" r:id="rId7"/>
-    <p:sldId id="264" r:id="rId8"/>
-    <p:sldId id="262" r:id="rId9"/>
-    <p:sldId id="263" r:id="rId10"/>
+    <p:sldId id="260" r:id="rId5"/>
+    <p:sldId id="261" r:id="rId6"/>
+    <p:sldId id="264" r:id="rId7"/>
+    <p:sldId id="262" r:id="rId8"/>
+    <p:sldId id="263" r:id="rId9"/>
+    <p:sldId id="265" r:id="rId10"/>
   </p:sldIdLst>
   <p:sldSz cx="12192000" cy="6858000"/>
   <p:notesSz cx="6858000" cy="9144000"/>
@@ -4329,7 +4329,7 @@
           <p:cNvPr id="2" name="Title 1">
             <a:extLst>
               <a:ext uri="{FF2B5EF4-FFF2-40B4-BE49-F238E27FC236}">
-                <a16:creationId xmlns:a16="http://schemas.microsoft.com/office/drawing/2014/main" id="{6B59E1FC-3D22-435C-AACE-8848E3076D6F}"/>
+                <a16:creationId xmlns:a16="http://schemas.microsoft.com/office/drawing/2014/main" id="{FCF67970-C05E-4B41-82A0-B882EBC7031B}"/>
               </a:ext>
             </a:extLst>
           </p:cNvPr>
@@ -4347,42 +4347,297 @@
           <a:p>
             <a:r>
               <a:rPr lang="en-GB" dirty="0"/>
-              <a:t>PathwayMatcher v1.4 (Data extractor)</a:t>
-            </a:r>
-          </a:p>
-        </p:txBody>
-      </p:sp>
-      <p:sp>
-        <p:nvSpPr>
-          <p:cNvPr id="3" name="Content Placeholder 2">
-            <a:extLst>
-              <a:ext uri="{FF2B5EF4-FFF2-40B4-BE49-F238E27FC236}">
-                <a16:creationId xmlns:a16="http://schemas.microsoft.com/office/drawing/2014/main" id="{49803BE8-E2E8-48EE-A6CD-E06284D04F85}"/>
-              </a:ext>
-            </a:extLst>
-          </p:cNvPr>
-          <p:cNvSpPr>
-            <a:spLocks noGrp="1"/>
-          </p:cNvSpPr>
-          <p:nvPr>
-            <p:ph idx="1"/>
-          </p:nvPr>
-        </p:nvSpPr>
-        <p:spPr/>
-        <p:txBody>
-          <a:bodyPr/>
-          <a:lstStyle/>
-          <a:p>
-            <a:endParaRPr lang="en-GB" dirty="0"/>
-          </a:p>
-        </p:txBody>
-      </p:sp>
-      <p:sp>
-        <p:nvSpPr>
-          <p:cNvPr id="4" name="Flowchart: Data 3">
-            <a:extLst>
-              <a:ext uri="{FF2B5EF4-FFF2-40B4-BE49-F238E27FC236}">
-                <a16:creationId xmlns:a16="http://schemas.microsoft.com/office/drawing/2014/main" id="{613C46D4-C182-49C8-9EB4-4CCED1DA454E}"/>
+              <a:t>Data conversion</a:t>
+            </a:r>
+          </a:p>
+        </p:txBody>
+      </p:sp>
+      <p:sp>
+        <p:nvSpPr>
+          <p:cNvPr id="5" name="TextBox 4">
+            <a:extLst>
+              <a:ext uri="{FF2B5EF4-FFF2-40B4-BE49-F238E27FC236}">
+                <a16:creationId xmlns:a16="http://schemas.microsoft.com/office/drawing/2014/main" id="{01228489-03B4-4D65-88E6-3A4DD8FB244C}"/>
+              </a:ext>
+            </a:extLst>
+          </p:cNvPr>
+          <p:cNvSpPr txBox="1"/>
+          <p:nvPr/>
+        </p:nvSpPr>
+        <p:spPr>
+          <a:xfrm>
+            <a:off x="3394630" y="2696492"/>
+            <a:ext cx="558166" cy="369332"/>
+          </a:xfrm>
+          <a:prstGeom prst="rect">
+            <a:avLst/>
+          </a:prstGeom>
+          <a:noFill/>
+        </p:spPr>
+        <p:txBody>
+          <a:bodyPr wrap="none" rtlCol="0">
+            <a:spAutoFit/>
+          </a:bodyPr>
+          <a:lstStyle/>
+          <a:p>
+            <a:r>
+              <a:rPr lang="en-GB" dirty="0"/>
+              <a:t>SNP</a:t>
+            </a:r>
+          </a:p>
+        </p:txBody>
+      </p:sp>
+      <p:sp>
+        <p:nvSpPr>
+          <p:cNvPr id="6" name="TextBox 5">
+            <a:extLst>
+              <a:ext uri="{FF2B5EF4-FFF2-40B4-BE49-F238E27FC236}">
+                <a16:creationId xmlns:a16="http://schemas.microsoft.com/office/drawing/2014/main" id="{86FFE9F6-A2BD-4EB3-8584-A97618C52BF3}"/>
+              </a:ext>
+            </a:extLst>
+          </p:cNvPr>
+          <p:cNvSpPr txBox="1"/>
+          <p:nvPr/>
+        </p:nvSpPr>
+        <p:spPr>
+          <a:xfrm>
+            <a:off x="3177841" y="3657600"/>
+            <a:ext cx="991746" cy="369332"/>
+          </a:xfrm>
+          <a:prstGeom prst="rect">
+            <a:avLst/>
+          </a:prstGeom>
+          <a:noFill/>
+        </p:spPr>
+        <p:txBody>
+          <a:bodyPr wrap="none" rtlCol="0">
+            <a:spAutoFit/>
+          </a:bodyPr>
+          <a:lstStyle/>
+          <a:p>
+            <a:r>
+              <a:rPr lang="en-GB" dirty="0"/>
+              <a:t>Peptides</a:t>
+            </a:r>
+          </a:p>
+        </p:txBody>
+      </p:sp>
+      <p:sp>
+        <p:nvSpPr>
+          <p:cNvPr id="7" name="TextBox 6">
+            <a:extLst>
+              <a:ext uri="{FF2B5EF4-FFF2-40B4-BE49-F238E27FC236}">
+                <a16:creationId xmlns:a16="http://schemas.microsoft.com/office/drawing/2014/main" id="{3680BDB7-8E75-4C2E-9503-C81BECE4E849}"/>
+              </a:ext>
+            </a:extLst>
+          </p:cNvPr>
+          <p:cNvSpPr txBox="1"/>
+          <p:nvPr/>
+        </p:nvSpPr>
+        <p:spPr>
+          <a:xfrm>
+            <a:off x="2724191" y="4584127"/>
+            <a:ext cx="1899046" cy="369332"/>
+          </a:xfrm>
+          <a:prstGeom prst="rect">
+            <a:avLst/>
+          </a:prstGeom>
+          <a:noFill/>
+        </p:spPr>
+        <p:txBody>
+          <a:bodyPr wrap="none" rtlCol="0">
+            <a:spAutoFit/>
+          </a:bodyPr>
+          <a:lstStyle/>
+          <a:p>
+            <a:r>
+              <a:rPr lang="en-GB" dirty="0"/>
+              <a:t>Modified Peptides</a:t>
+            </a:r>
+          </a:p>
+        </p:txBody>
+      </p:sp>
+      <p:sp>
+        <p:nvSpPr>
+          <p:cNvPr id="8" name="TextBox 7">
+            <a:extLst>
+              <a:ext uri="{FF2B5EF4-FFF2-40B4-BE49-F238E27FC236}">
+                <a16:creationId xmlns:a16="http://schemas.microsoft.com/office/drawing/2014/main" id="{DB84A4BA-3834-4DB7-BD30-E03A02C44181}"/>
+              </a:ext>
+            </a:extLst>
+          </p:cNvPr>
+          <p:cNvSpPr txBox="1"/>
+          <p:nvPr/>
+        </p:nvSpPr>
+        <p:spPr>
+          <a:xfrm>
+            <a:off x="3287229" y="3185928"/>
+            <a:ext cx="772969" cy="369332"/>
+          </a:xfrm>
+          <a:prstGeom prst="rect">
+            <a:avLst/>
+          </a:prstGeom>
+          <a:noFill/>
+        </p:spPr>
+        <p:txBody>
+          <a:bodyPr wrap="none" rtlCol="0">
+            <a:spAutoFit/>
+          </a:bodyPr>
+          <a:lstStyle/>
+          <a:p>
+            <a:r>
+              <a:rPr lang="en-GB" dirty="0"/>
+              <a:t>Genes</a:t>
+            </a:r>
+          </a:p>
+        </p:txBody>
+      </p:sp>
+      <p:sp>
+        <p:nvSpPr>
+          <p:cNvPr id="9" name="TextBox 8">
+            <a:extLst>
+              <a:ext uri="{FF2B5EF4-FFF2-40B4-BE49-F238E27FC236}">
+                <a16:creationId xmlns:a16="http://schemas.microsoft.com/office/drawing/2014/main" id="{23C510E2-9F59-466E-8097-8F3DB5230263}"/>
+              </a:ext>
+            </a:extLst>
+          </p:cNvPr>
+          <p:cNvSpPr txBox="1"/>
+          <p:nvPr/>
+        </p:nvSpPr>
+        <p:spPr>
+          <a:xfrm>
+            <a:off x="5702658" y="3244334"/>
+            <a:ext cx="955903" cy="369332"/>
+          </a:xfrm>
+          <a:prstGeom prst="rect">
+            <a:avLst/>
+          </a:prstGeom>
+          <a:noFill/>
+        </p:spPr>
+        <p:txBody>
+          <a:bodyPr wrap="none" rtlCol="0">
+            <a:spAutoFit/>
+          </a:bodyPr>
+          <a:lstStyle/>
+          <a:p>
+            <a:r>
+              <a:rPr lang="en-GB" dirty="0"/>
+              <a:t>Proteins</a:t>
+            </a:r>
+          </a:p>
+        </p:txBody>
+      </p:sp>
+      <p:sp>
+        <p:nvSpPr>
+          <p:cNvPr id="10" name="TextBox 9">
+            <a:extLst>
+              <a:ext uri="{FF2B5EF4-FFF2-40B4-BE49-F238E27FC236}">
+                <a16:creationId xmlns:a16="http://schemas.microsoft.com/office/drawing/2014/main" id="{A644A67D-118C-4766-817B-8A37A06C6C20}"/>
+              </a:ext>
+            </a:extLst>
+          </p:cNvPr>
+          <p:cNvSpPr txBox="1"/>
+          <p:nvPr/>
+        </p:nvSpPr>
+        <p:spPr>
+          <a:xfrm>
+            <a:off x="5597631" y="4569098"/>
+            <a:ext cx="1354986" cy="369332"/>
+          </a:xfrm>
+          <a:prstGeom prst="rect">
+            <a:avLst/>
+          </a:prstGeom>
+          <a:noFill/>
+        </p:spPr>
+        <p:txBody>
+          <a:bodyPr wrap="none" rtlCol="0">
+            <a:spAutoFit/>
+          </a:bodyPr>
+          <a:lstStyle/>
+          <a:p>
+            <a:r>
+              <a:rPr lang="en-GB" dirty="0"/>
+              <a:t>Proteoforms</a:t>
+            </a:r>
+          </a:p>
+        </p:txBody>
+      </p:sp>
+      <p:sp>
+        <p:nvSpPr>
+          <p:cNvPr id="11" name="TextBox 10">
+            <a:extLst>
+              <a:ext uri="{FF2B5EF4-FFF2-40B4-BE49-F238E27FC236}">
+                <a16:creationId xmlns:a16="http://schemas.microsoft.com/office/drawing/2014/main" id="{2874E7D2-0CAC-4AD3-9C60-9DD49AACAC75}"/>
+              </a:ext>
+            </a:extLst>
+          </p:cNvPr>
+          <p:cNvSpPr txBox="1"/>
+          <p:nvPr/>
+        </p:nvSpPr>
+        <p:spPr>
+          <a:xfrm>
+            <a:off x="7662673" y="3813061"/>
+            <a:ext cx="1092735" cy="369332"/>
+          </a:xfrm>
+          <a:prstGeom prst="rect">
+            <a:avLst/>
+          </a:prstGeom>
+          <a:noFill/>
+        </p:spPr>
+        <p:txBody>
+          <a:bodyPr wrap="none" rtlCol="0">
+            <a:spAutoFit/>
+          </a:bodyPr>
+          <a:lstStyle/>
+          <a:p>
+            <a:r>
+              <a:rPr lang="en-GB" dirty="0"/>
+              <a:t>Reactions</a:t>
+            </a:r>
+          </a:p>
+        </p:txBody>
+      </p:sp>
+      <p:sp>
+        <p:nvSpPr>
+          <p:cNvPr id="12" name="TextBox 11">
+            <a:extLst>
+              <a:ext uri="{FF2B5EF4-FFF2-40B4-BE49-F238E27FC236}">
+                <a16:creationId xmlns:a16="http://schemas.microsoft.com/office/drawing/2014/main" id="{9AF8A85F-A579-4F41-AD3A-9861AE5C7765}"/>
+              </a:ext>
+            </a:extLst>
+          </p:cNvPr>
+          <p:cNvSpPr txBox="1"/>
+          <p:nvPr/>
+        </p:nvSpPr>
+        <p:spPr>
+          <a:xfrm>
+            <a:off x="9619489" y="3808537"/>
+            <a:ext cx="1064715" cy="369332"/>
+          </a:xfrm>
+          <a:prstGeom prst="rect">
+            <a:avLst/>
+          </a:prstGeom>
+          <a:noFill/>
+        </p:spPr>
+        <p:txBody>
+          <a:bodyPr wrap="none" rtlCol="0">
+            <a:spAutoFit/>
+          </a:bodyPr>
+          <a:lstStyle/>
+          <a:p>
+            <a:r>
+              <a:rPr lang="en-GB" dirty="0"/>
+              <a:t>Pathways</a:t>
+            </a:r>
+          </a:p>
+        </p:txBody>
+      </p:sp>
+      <p:sp>
+        <p:nvSpPr>
+          <p:cNvPr id="13" name="Arrow: Right 12">
+            <a:extLst>
+              <a:ext uri="{FF2B5EF4-FFF2-40B4-BE49-F238E27FC236}">
+                <a16:creationId xmlns:a16="http://schemas.microsoft.com/office/drawing/2014/main" id="{4DD4A2CE-C362-4CFB-AEE0-2B390AD2D121}"/>
               </a:ext>
             </a:extLst>
           </p:cNvPr>
@@ -4391,10 +4646,10 @@
         </p:nvSpPr>
         <p:spPr>
           <a:xfrm>
-            <a:off x="3986197" y="2385095"/>
-            <a:ext cx="1686433" cy="1068304"/>
-          </a:xfrm>
-          <a:prstGeom prst="flowChartInputOutput">
+            <a:off x="9003158" y="3756582"/>
+            <a:ext cx="529390" cy="473242"/>
+          </a:xfrm>
+          <a:prstGeom prst="rightArrow">
             <a:avLst/>
           </a:prstGeom>
         </p:spPr>
@@ -4419,19 +4674,16 @@
           <a:lstStyle/>
           <a:p>
             <a:pPr algn="ctr"/>
-            <a:r>
-              <a:rPr lang="en-GB" dirty="0"/>
-              <a:t>VEP Tables</a:t>
-            </a:r>
-          </a:p>
-        </p:txBody>
-      </p:sp>
-      <p:sp>
-        <p:nvSpPr>
-          <p:cNvPr id="5" name="Flowchart: Process 4">
-            <a:extLst>
-              <a:ext uri="{FF2B5EF4-FFF2-40B4-BE49-F238E27FC236}">
-                <a16:creationId xmlns:a16="http://schemas.microsoft.com/office/drawing/2014/main" id="{3FAA41D5-B003-442E-92CD-C295620EDC20}"/>
+            <a:endParaRPr lang="en-GB"/>
+          </a:p>
+        </p:txBody>
+      </p:sp>
+      <p:sp>
+        <p:nvSpPr>
+          <p:cNvPr id="14" name="Arrow: Right 13">
+            <a:extLst>
+              <a:ext uri="{FF2B5EF4-FFF2-40B4-BE49-F238E27FC236}">
+                <a16:creationId xmlns:a16="http://schemas.microsoft.com/office/drawing/2014/main" id="{65C538D5-0520-407D-AE4F-670D0A418C8A}"/>
               </a:ext>
             </a:extLst>
           </p:cNvPr>
@@ -4439,11 +4691,11 @@
           <p:nvPr/>
         </p:nvSpPr>
         <p:spPr>
-          <a:xfrm>
-            <a:off x="1340268" y="4244641"/>
-            <a:ext cx="1436771" cy="1141080"/>
-          </a:xfrm>
-          <a:prstGeom prst="flowChartProcess">
+          <a:xfrm rot="2536312">
+            <a:off x="7042950" y="3302445"/>
+            <a:ext cx="529390" cy="473242"/>
+          </a:xfrm>
+          <a:prstGeom prst="rightArrow">
             <a:avLst/>
           </a:prstGeom>
         </p:spPr>
@@ -4468,19 +4720,16 @@
           <a:lstStyle/>
           <a:p>
             <a:pPr algn="ctr"/>
-            <a:r>
-              <a:rPr lang="en-GB" dirty="0"/>
-              <a:t>Extract Reactions and Pathways</a:t>
-            </a:r>
-          </a:p>
-        </p:txBody>
-      </p:sp>
-      <p:sp>
-        <p:nvSpPr>
-          <p:cNvPr id="6" name="Flowchart: Data 5">
-            <a:extLst>
-              <a:ext uri="{FF2B5EF4-FFF2-40B4-BE49-F238E27FC236}">
-                <a16:creationId xmlns:a16="http://schemas.microsoft.com/office/drawing/2014/main" id="{3871FF2F-2A2C-4CE1-A8EF-FECCC19CB941}"/>
+            <a:endParaRPr lang="en-GB"/>
+          </a:p>
+        </p:txBody>
+      </p:sp>
+      <p:sp>
+        <p:nvSpPr>
+          <p:cNvPr id="15" name="Arrow: Right 14">
+            <a:extLst>
+              <a:ext uri="{FF2B5EF4-FFF2-40B4-BE49-F238E27FC236}">
+                <a16:creationId xmlns:a16="http://schemas.microsoft.com/office/drawing/2014/main" id="{E44B5301-BDA2-455E-B288-D5EC4A1B70AC}"/>
               </a:ext>
             </a:extLst>
           </p:cNvPr>
@@ -4488,11 +4737,11 @@
           <p:nvPr/>
         </p:nvSpPr>
         <p:spPr>
-          <a:xfrm>
-            <a:off x="8983579" y="3264568"/>
-            <a:ext cx="2005263" cy="1141079"/>
-          </a:xfrm>
-          <a:prstGeom prst="flowChartInputOutput">
+          <a:xfrm rot="18929173">
+            <a:off x="7047960" y="4347506"/>
+            <a:ext cx="529390" cy="473242"/>
+          </a:xfrm>
+          <a:prstGeom prst="rightArrow">
             <a:avLst/>
           </a:prstGeom>
         </p:spPr>
@@ -4517,19 +4766,16 @@
           <a:lstStyle/>
           <a:p>
             <a:pPr algn="ctr"/>
-            <a:r>
-              <a:rPr lang="en-GB" dirty="0"/>
-              <a:t>Reactions and Pathways</a:t>
-            </a:r>
-          </a:p>
-        </p:txBody>
-      </p:sp>
-      <p:sp>
-        <p:nvSpPr>
-          <p:cNvPr id="7" name="Arrow: Right 6">
-            <a:extLst>
-              <a:ext uri="{FF2B5EF4-FFF2-40B4-BE49-F238E27FC236}">
-                <a16:creationId xmlns:a16="http://schemas.microsoft.com/office/drawing/2014/main" id="{3C4F03D3-F3DF-474C-8EE7-8635F792A13B}"/>
+            <a:endParaRPr lang="en-GB"/>
+          </a:p>
+        </p:txBody>
+      </p:sp>
+      <p:sp>
+        <p:nvSpPr>
+          <p:cNvPr id="16" name="Arrow: Right 15">
+            <a:extLst>
+              <a:ext uri="{FF2B5EF4-FFF2-40B4-BE49-F238E27FC236}">
+                <a16:creationId xmlns:a16="http://schemas.microsoft.com/office/drawing/2014/main" id="{8E0F715B-CEED-4FF4-ADAA-D912DED2C3EE}"/>
               </a:ext>
             </a:extLst>
           </p:cNvPr>
@@ -4538,7 +4784,7 @@
         </p:nvSpPr>
         <p:spPr>
           <a:xfrm>
-            <a:off x="3179339" y="4578560"/>
+            <a:off x="4879212" y="3184358"/>
             <a:ext cx="529390" cy="473242"/>
           </a:xfrm>
           <a:prstGeom prst="rightArrow">
@@ -4572,10 +4818,10 @@
       </p:sp>
       <p:sp>
         <p:nvSpPr>
-          <p:cNvPr id="8" name="Arrow: Right 7">
-            <a:extLst>
-              <a:ext uri="{FF2B5EF4-FFF2-40B4-BE49-F238E27FC236}">
-                <a16:creationId xmlns:a16="http://schemas.microsoft.com/office/drawing/2014/main" id="{0B536E99-2307-4B03-9029-34710375B76F}"/>
+          <p:cNvPr id="17" name="Arrow: Right 16">
+            <a:extLst>
+              <a:ext uri="{FF2B5EF4-FFF2-40B4-BE49-F238E27FC236}">
+                <a16:creationId xmlns:a16="http://schemas.microsoft.com/office/drawing/2014/main" id="{C2B0A06C-478F-4C4E-8ABC-49DD9D16BC67}"/>
               </a:ext>
             </a:extLst>
           </p:cNvPr>
@@ -4584,7 +4830,7 @@
         </p:nvSpPr>
         <p:spPr>
           <a:xfrm>
-            <a:off x="8237621" y="3649579"/>
+            <a:off x="4904154" y="4517143"/>
             <a:ext cx="529390" cy="473242"/>
           </a:xfrm>
           <a:prstGeom prst="rightArrow">
@@ -4618,10 +4864,10 @@
       </p:sp>
       <p:sp>
         <p:nvSpPr>
-          <p:cNvPr id="10" name="Flowchart: Data 9">
-            <a:extLst>
-              <a:ext uri="{FF2B5EF4-FFF2-40B4-BE49-F238E27FC236}">
-                <a16:creationId xmlns:a16="http://schemas.microsoft.com/office/drawing/2014/main" id="{69379B3E-B060-46E1-8766-E38680443F0F}"/>
+          <p:cNvPr id="18" name="Right Brace 17">
+            <a:extLst>
+              <a:ext uri="{FF2B5EF4-FFF2-40B4-BE49-F238E27FC236}">
+                <a16:creationId xmlns:a16="http://schemas.microsoft.com/office/drawing/2014/main" id="{F7066981-7F32-458A-A036-D8684C6FC1B6}"/>
               </a:ext>
             </a:extLst>
           </p:cNvPr>
@@ -4630,27 +4876,26 @@
         </p:nvSpPr>
         <p:spPr>
           <a:xfrm>
-            <a:off x="1120442" y="2087230"/>
-            <a:ext cx="1876425" cy="1366169"/>
-          </a:xfrm>
-          <a:prstGeom prst="flowChartInputOutput">
-            <a:avLst/>
-          </a:prstGeom>
+            <a:off x="4268161" y="2696492"/>
+            <a:ext cx="251124" cy="1451017"/>
+          </a:xfrm>
+          <a:prstGeom prst="rightBrace">
+            <a:avLst/>
+          </a:prstGeom>
+          <a:ln w="38100"/>
         </p:spPr>
         <p:style>
-          <a:lnRef idx="2">
-            <a:schemeClr val="accent1">
-              <a:shade val="50000"/>
-            </a:schemeClr>
+          <a:lnRef idx="1">
+            <a:schemeClr val="accent1"/>
           </a:lnRef>
-          <a:fillRef idx="1">
+          <a:fillRef idx="0">
             <a:schemeClr val="accent1"/>
           </a:fillRef>
           <a:effectRef idx="0">
             <a:schemeClr val="accent1"/>
           </a:effectRef>
           <a:fontRef idx="minor">
-            <a:schemeClr val="lt1"/>
+            <a:schemeClr val="tx1"/>
           </a:fontRef>
         </p:style>
         <p:txBody>
@@ -4658,119 +4903,14 @@
           <a:lstStyle/>
           <a:p>
             <a:pPr algn="ctr"/>
-            <a:r>
-              <a:rPr lang="en-GB" dirty="0"/>
-              <a:t>Reactome</a:t>
-            </a:r>
-          </a:p>
-          <a:p>
-            <a:pPr algn="ctr"/>
-            <a:r>
-              <a:rPr lang="en-GB" dirty="0"/>
-              <a:t>Pathways and Reactions</a:t>
-            </a:r>
-          </a:p>
-        </p:txBody>
-      </p:sp>
-      <p:sp>
-        <p:nvSpPr>
-          <p:cNvPr id="12" name="Arrow: Right 11">
-            <a:extLst>
-              <a:ext uri="{FF2B5EF4-FFF2-40B4-BE49-F238E27FC236}">
-                <a16:creationId xmlns:a16="http://schemas.microsoft.com/office/drawing/2014/main" id="{3CA28C9D-E87D-4E4C-8F37-62D908D5905B}"/>
-              </a:ext>
-            </a:extLst>
-          </p:cNvPr>
-          <p:cNvSpPr/>
-          <p:nvPr/>
-        </p:nvSpPr>
-        <p:spPr>
-          <a:xfrm rot="5400000">
-            <a:off x="1793958" y="3621505"/>
-            <a:ext cx="529390" cy="473242"/>
-          </a:xfrm>
-          <a:prstGeom prst="rightArrow">
-            <a:avLst/>
-          </a:prstGeom>
-        </p:spPr>
-        <p:style>
-          <a:lnRef idx="2">
-            <a:schemeClr val="accent1">
-              <a:shade val="50000"/>
-            </a:schemeClr>
-          </a:lnRef>
-          <a:fillRef idx="1">
-            <a:schemeClr val="accent1"/>
-          </a:fillRef>
-          <a:effectRef idx="0">
-            <a:schemeClr val="accent1"/>
-          </a:effectRef>
-          <a:fontRef idx="minor">
-            <a:schemeClr val="lt1"/>
-          </a:fontRef>
-        </p:style>
-        <p:txBody>
-          <a:bodyPr rtlCol="0" anchor="ctr"/>
-          <a:lstStyle/>
-          <a:p>
-            <a:pPr algn="ctr"/>
-            <a:endParaRPr lang="en-GB"/>
-          </a:p>
-        </p:txBody>
-      </p:sp>
-      <p:sp>
-        <p:nvSpPr>
-          <p:cNvPr id="13" name="Flowchart: Process 12">
-            <a:extLst>
-              <a:ext uri="{FF2B5EF4-FFF2-40B4-BE49-F238E27FC236}">
-                <a16:creationId xmlns:a16="http://schemas.microsoft.com/office/drawing/2014/main" id="{42D75D1A-40A7-4281-836B-15846818372A}"/>
-              </a:ext>
-            </a:extLst>
-          </p:cNvPr>
-          <p:cNvSpPr/>
-          <p:nvPr/>
-        </p:nvSpPr>
-        <p:spPr>
-          <a:xfrm>
-            <a:off x="4111029" y="4244641"/>
-            <a:ext cx="1436771" cy="1141080"/>
-          </a:xfrm>
-          <a:prstGeom prst="flowChartProcess">
-            <a:avLst/>
-          </a:prstGeom>
-        </p:spPr>
-        <p:style>
-          <a:lnRef idx="2">
-            <a:schemeClr val="accent1">
-              <a:shade val="50000"/>
-            </a:schemeClr>
-          </a:lnRef>
-          <a:fillRef idx="1">
-            <a:schemeClr val="accent1"/>
-          </a:fillRef>
-          <a:effectRef idx="0">
-            <a:schemeClr val="accent1"/>
-          </a:effectRef>
-          <a:fontRef idx="minor">
-            <a:schemeClr val="lt1"/>
-          </a:fontRef>
-        </p:style>
-        <p:txBody>
-          <a:bodyPr rtlCol="0" anchor="ctr"/>
-          <a:lstStyle/>
-          <a:p>
-            <a:pPr algn="ctr"/>
-            <a:r>
-              <a:rPr lang="en-GB" dirty="0"/>
-              <a:t>Extract Reactions and Pathways</a:t>
-            </a:r>
+            <a:endParaRPr lang="en-GB"/>
           </a:p>
         </p:txBody>
       </p:sp>
     </p:spTree>
     <p:extLst>
       <p:ext uri="{BB962C8B-B14F-4D97-AF65-F5344CB8AC3E}">
-        <p14:creationId xmlns:p14="http://schemas.microsoft.com/office/powerpoint/2010/main" val="2428170653"/>
+        <p14:creationId xmlns:p14="http://schemas.microsoft.com/office/powerpoint/2010/main" val="1486385229"/>
       </p:ext>
     </p:extLst>
   </p:cSld>
@@ -4820,7 +4960,7 @@
           <a:p>
             <a:r>
               <a:rPr lang="en-GB" dirty="0"/>
-              <a:t>Data conversion</a:t>
+              <a:t>Static mapping requirements</a:t>
             </a:r>
           </a:p>
         </p:txBody>
@@ -4909,7 +5049,7 @@
         </p:nvSpPr>
         <p:spPr>
           <a:xfrm>
-            <a:off x="2724191" y="4584127"/>
+            <a:off x="558482" y="4644242"/>
             <a:ext cx="1899046" cy="369332"/>
           </a:xfrm>
           <a:prstGeom prst="rect">
@@ -4979,7 +5119,7 @@
         </p:nvSpPr>
         <p:spPr>
           <a:xfrm>
-            <a:off x="5702658" y="3244334"/>
+            <a:off x="5657154" y="3818190"/>
             <a:ext cx="955903" cy="369332"/>
           </a:xfrm>
           <a:prstGeom prst="rect">
@@ -5014,7 +5154,7 @@
         </p:nvSpPr>
         <p:spPr>
           <a:xfrm>
-            <a:off x="5597631" y="4569098"/>
+            <a:off x="3431922" y="4629213"/>
             <a:ext cx="1354986" cy="369332"/>
           </a:xfrm>
           <a:prstGeom prst="rect">
@@ -5164,8 +5304,8 @@
           <p:nvPr/>
         </p:nvSpPr>
         <p:spPr>
-          <a:xfrm rot="2536312">
-            <a:off x="7042950" y="3302445"/>
+          <a:xfrm>
+            <a:off x="6885533" y="3756582"/>
             <a:ext cx="529390" cy="473242"/>
           </a:xfrm>
           <a:prstGeom prst="rightArrow">
@@ -5211,7 +5351,7 @@
         </p:nvSpPr>
         <p:spPr>
           <a:xfrm rot="18929173">
-            <a:off x="7047960" y="4347506"/>
+            <a:off x="4876852" y="4422651"/>
             <a:ext cx="529390" cy="473242"/>
           </a:xfrm>
           <a:prstGeom prst="rightArrow">
@@ -5256,8 +5396,8 @@
           <p:nvPr/>
         </p:nvSpPr>
         <p:spPr>
-          <a:xfrm>
-            <a:off x="4879212" y="3184358"/>
+          <a:xfrm rot="1702888">
+            <a:off x="4854618" y="3431029"/>
             <a:ext cx="529390" cy="473242"/>
           </a:xfrm>
           <a:prstGeom prst="rightArrow">
@@ -5303,7 +5443,7 @@
         </p:nvSpPr>
         <p:spPr>
           <a:xfrm>
-            <a:off x="4904154" y="4517143"/>
+            <a:off x="2738445" y="4577258"/>
             <a:ext cx="529390" cy="473242"/>
           </a:xfrm>
           <a:prstGeom prst="rightArrow">
@@ -5383,7 +5523,7 @@
     </p:spTree>
     <p:extLst>
       <p:ext uri="{BB962C8B-B14F-4D97-AF65-F5344CB8AC3E}">
-        <p14:creationId xmlns:p14="http://schemas.microsoft.com/office/powerpoint/2010/main" val="1486385229"/>
+        <p14:creationId xmlns:p14="http://schemas.microsoft.com/office/powerpoint/2010/main" val="534751654"/>
       </p:ext>
     </p:extLst>
   </p:cSld>
@@ -5415,7 +5555,7 @@
           <p:cNvPr id="2" name="Title 1">
             <a:extLst>
               <a:ext uri="{FF2B5EF4-FFF2-40B4-BE49-F238E27FC236}">
-                <a16:creationId xmlns:a16="http://schemas.microsoft.com/office/drawing/2014/main" id="{FCF67970-C05E-4B41-82A0-B882EBC7031B}"/>
+                <a16:creationId xmlns:a16="http://schemas.microsoft.com/office/drawing/2014/main" id="{C165EFA6-408F-43D2-AE9D-CC9571C92781}"/>
               </a:ext>
             </a:extLst>
           </p:cNvPr>
@@ -5432,298 +5572,18 @@
           <a:lstStyle/>
           <a:p>
             <a:r>
-              <a:rPr lang="en-GB" dirty="0"/>
-              <a:t>Static mapping requirements</a:t>
-            </a:r>
-          </a:p>
-        </p:txBody>
-      </p:sp>
-      <p:sp>
-        <p:nvSpPr>
-          <p:cNvPr id="5" name="TextBox 4">
-            <a:extLst>
-              <a:ext uri="{FF2B5EF4-FFF2-40B4-BE49-F238E27FC236}">
-                <a16:creationId xmlns:a16="http://schemas.microsoft.com/office/drawing/2014/main" id="{01228489-03B4-4D65-88E6-3A4DD8FB244C}"/>
-              </a:ext>
-            </a:extLst>
-          </p:cNvPr>
-          <p:cNvSpPr txBox="1"/>
-          <p:nvPr/>
-        </p:nvSpPr>
-        <p:spPr>
-          <a:xfrm>
-            <a:off x="3394630" y="2696492"/>
-            <a:ext cx="558166" cy="369332"/>
-          </a:xfrm>
-          <a:prstGeom prst="rect">
-            <a:avLst/>
-          </a:prstGeom>
-          <a:noFill/>
-        </p:spPr>
-        <p:txBody>
-          <a:bodyPr wrap="none" rtlCol="0">
-            <a:spAutoFit/>
-          </a:bodyPr>
-          <a:lstStyle/>
-          <a:p>
-            <a:r>
-              <a:rPr lang="en-GB" dirty="0"/>
-              <a:t>SNP</a:t>
-            </a:r>
-          </a:p>
-        </p:txBody>
-      </p:sp>
-      <p:sp>
-        <p:nvSpPr>
-          <p:cNvPr id="6" name="TextBox 5">
-            <a:extLst>
-              <a:ext uri="{FF2B5EF4-FFF2-40B4-BE49-F238E27FC236}">
-                <a16:creationId xmlns:a16="http://schemas.microsoft.com/office/drawing/2014/main" id="{86FFE9F6-A2BD-4EB3-8584-A97618C52BF3}"/>
-              </a:ext>
-            </a:extLst>
-          </p:cNvPr>
-          <p:cNvSpPr txBox="1"/>
-          <p:nvPr/>
-        </p:nvSpPr>
-        <p:spPr>
-          <a:xfrm>
-            <a:off x="3177841" y="3657600"/>
-            <a:ext cx="991746" cy="369332"/>
-          </a:xfrm>
-          <a:prstGeom prst="rect">
-            <a:avLst/>
-          </a:prstGeom>
-          <a:noFill/>
-        </p:spPr>
-        <p:txBody>
-          <a:bodyPr wrap="none" rtlCol="0">
-            <a:spAutoFit/>
-          </a:bodyPr>
-          <a:lstStyle/>
-          <a:p>
-            <a:r>
-              <a:rPr lang="en-GB" dirty="0"/>
-              <a:t>Peptides</a:t>
-            </a:r>
-          </a:p>
-        </p:txBody>
-      </p:sp>
-      <p:sp>
-        <p:nvSpPr>
-          <p:cNvPr id="7" name="TextBox 6">
-            <a:extLst>
-              <a:ext uri="{FF2B5EF4-FFF2-40B4-BE49-F238E27FC236}">
-                <a16:creationId xmlns:a16="http://schemas.microsoft.com/office/drawing/2014/main" id="{3680BDB7-8E75-4C2E-9503-C81BECE4E849}"/>
-              </a:ext>
-            </a:extLst>
-          </p:cNvPr>
-          <p:cNvSpPr txBox="1"/>
-          <p:nvPr/>
-        </p:nvSpPr>
-        <p:spPr>
-          <a:xfrm>
-            <a:off x="558482" y="4644242"/>
-            <a:ext cx="1899046" cy="369332"/>
-          </a:xfrm>
-          <a:prstGeom prst="rect">
-            <a:avLst/>
-          </a:prstGeom>
-          <a:noFill/>
-        </p:spPr>
-        <p:txBody>
-          <a:bodyPr wrap="none" rtlCol="0">
-            <a:spAutoFit/>
-          </a:bodyPr>
-          <a:lstStyle/>
-          <a:p>
-            <a:r>
-              <a:rPr lang="en-GB" dirty="0"/>
-              <a:t>Modified Peptides</a:t>
-            </a:r>
-          </a:p>
-        </p:txBody>
-      </p:sp>
-      <p:sp>
-        <p:nvSpPr>
-          <p:cNvPr id="8" name="TextBox 7">
-            <a:extLst>
-              <a:ext uri="{FF2B5EF4-FFF2-40B4-BE49-F238E27FC236}">
-                <a16:creationId xmlns:a16="http://schemas.microsoft.com/office/drawing/2014/main" id="{DB84A4BA-3834-4DB7-BD30-E03A02C44181}"/>
-              </a:ext>
-            </a:extLst>
-          </p:cNvPr>
-          <p:cNvSpPr txBox="1"/>
-          <p:nvPr/>
-        </p:nvSpPr>
-        <p:spPr>
-          <a:xfrm>
-            <a:off x="3287229" y="3185928"/>
-            <a:ext cx="772969" cy="369332"/>
-          </a:xfrm>
-          <a:prstGeom prst="rect">
-            <a:avLst/>
-          </a:prstGeom>
-          <a:noFill/>
-        </p:spPr>
-        <p:txBody>
-          <a:bodyPr wrap="none" rtlCol="0">
-            <a:spAutoFit/>
-          </a:bodyPr>
-          <a:lstStyle/>
-          <a:p>
-            <a:r>
-              <a:rPr lang="en-GB" dirty="0"/>
-              <a:t>Genes</a:t>
-            </a:r>
-          </a:p>
-        </p:txBody>
-      </p:sp>
-      <p:sp>
-        <p:nvSpPr>
-          <p:cNvPr id="9" name="TextBox 8">
-            <a:extLst>
-              <a:ext uri="{FF2B5EF4-FFF2-40B4-BE49-F238E27FC236}">
-                <a16:creationId xmlns:a16="http://schemas.microsoft.com/office/drawing/2014/main" id="{23C510E2-9F59-466E-8097-8F3DB5230263}"/>
-              </a:ext>
-            </a:extLst>
-          </p:cNvPr>
-          <p:cNvSpPr txBox="1"/>
-          <p:nvPr/>
-        </p:nvSpPr>
-        <p:spPr>
-          <a:xfrm>
-            <a:off x="5657154" y="3818190"/>
-            <a:ext cx="955903" cy="369332"/>
-          </a:xfrm>
-          <a:prstGeom prst="rect">
-            <a:avLst/>
-          </a:prstGeom>
-          <a:noFill/>
-        </p:spPr>
-        <p:txBody>
-          <a:bodyPr wrap="none" rtlCol="0">
-            <a:spAutoFit/>
-          </a:bodyPr>
-          <a:lstStyle/>
-          <a:p>
-            <a:r>
-              <a:rPr lang="en-GB" dirty="0"/>
-              <a:t>Proteins</a:t>
-            </a:r>
-          </a:p>
-        </p:txBody>
-      </p:sp>
-      <p:sp>
-        <p:nvSpPr>
-          <p:cNvPr id="10" name="TextBox 9">
-            <a:extLst>
-              <a:ext uri="{FF2B5EF4-FFF2-40B4-BE49-F238E27FC236}">
-                <a16:creationId xmlns:a16="http://schemas.microsoft.com/office/drawing/2014/main" id="{A644A67D-118C-4766-817B-8A37A06C6C20}"/>
-              </a:ext>
-            </a:extLst>
-          </p:cNvPr>
-          <p:cNvSpPr txBox="1"/>
-          <p:nvPr/>
-        </p:nvSpPr>
-        <p:spPr>
-          <a:xfrm>
-            <a:off x="3431922" y="4629213"/>
-            <a:ext cx="1354986" cy="369332"/>
-          </a:xfrm>
-          <a:prstGeom prst="rect">
-            <a:avLst/>
-          </a:prstGeom>
-          <a:noFill/>
-        </p:spPr>
-        <p:txBody>
-          <a:bodyPr wrap="none" rtlCol="0">
-            <a:spAutoFit/>
-          </a:bodyPr>
-          <a:lstStyle/>
-          <a:p>
-            <a:r>
-              <a:rPr lang="en-GB" dirty="0"/>
-              <a:t>Proteoforms</a:t>
-            </a:r>
-          </a:p>
-        </p:txBody>
-      </p:sp>
-      <p:sp>
-        <p:nvSpPr>
-          <p:cNvPr id="11" name="TextBox 10">
-            <a:extLst>
-              <a:ext uri="{FF2B5EF4-FFF2-40B4-BE49-F238E27FC236}">
-                <a16:creationId xmlns:a16="http://schemas.microsoft.com/office/drawing/2014/main" id="{2874E7D2-0CAC-4AD3-9C60-9DD49AACAC75}"/>
-              </a:ext>
-            </a:extLst>
-          </p:cNvPr>
-          <p:cNvSpPr txBox="1"/>
-          <p:nvPr/>
-        </p:nvSpPr>
-        <p:spPr>
-          <a:xfrm>
-            <a:off x="7662673" y="3813061"/>
-            <a:ext cx="1092735" cy="369332"/>
-          </a:xfrm>
-          <a:prstGeom prst="rect">
-            <a:avLst/>
-          </a:prstGeom>
-          <a:noFill/>
-        </p:spPr>
-        <p:txBody>
-          <a:bodyPr wrap="none" rtlCol="0">
-            <a:spAutoFit/>
-          </a:bodyPr>
-          <a:lstStyle/>
-          <a:p>
-            <a:r>
-              <a:rPr lang="en-GB" dirty="0"/>
-              <a:t>Reactions</a:t>
-            </a:r>
-          </a:p>
-        </p:txBody>
-      </p:sp>
-      <p:sp>
-        <p:nvSpPr>
-          <p:cNvPr id="12" name="TextBox 11">
-            <a:extLst>
-              <a:ext uri="{FF2B5EF4-FFF2-40B4-BE49-F238E27FC236}">
-                <a16:creationId xmlns:a16="http://schemas.microsoft.com/office/drawing/2014/main" id="{9AF8A85F-A579-4F41-AD3A-9861AE5C7765}"/>
-              </a:ext>
-            </a:extLst>
-          </p:cNvPr>
-          <p:cNvSpPr txBox="1"/>
-          <p:nvPr/>
-        </p:nvSpPr>
-        <p:spPr>
-          <a:xfrm>
-            <a:off x="9619489" y="3808537"/>
-            <a:ext cx="1064715" cy="369332"/>
-          </a:xfrm>
-          <a:prstGeom prst="rect">
-            <a:avLst/>
-          </a:prstGeom>
-          <a:noFill/>
-        </p:spPr>
-        <p:txBody>
-          <a:bodyPr wrap="none" rtlCol="0">
-            <a:spAutoFit/>
-          </a:bodyPr>
-          <a:lstStyle/>
-          <a:p>
-            <a:r>
-              <a:rPr lang="en-GB" dirty="0"/>
-              <a:t>Pathways</a:t>
-            </a:r>
-          </a:p>
-        </p:txBody>
-      </p:sp>
-      <p:sp>
-        <p:nvSpPr>
-          <p:cNvPr id="13" name="Arrow: Right 12">
-            <a:extLst>
-              <a:ext uri="{FF2B5EF4-FFF2-40B4-BE49-F238E27FC236}">
-                <a16:creationId xmlns:a16="http://schemas.microsoft.com/office/drawing/2014/main" id="{4DD4A2CE-C362-4CFB-AEE0-2B390AD2D121}"/>
+              <a:rPr lang="en-US" dirty="0"/>
+              <a:t>Reference data extraction</a:t>
+            </a:r>
+          </a:p>
+        </p:txBody>
+      </p:sp>
+      <p:sp>
+        <p:nvSpPr>
+          <p:cNvPr id="10" name="Flowchart: Multidocument 9">
+            <a:extLst>
+              <a:ext uri="{FF2B5EF4-FFF2-40B4-BE49-F238E27FC236}">
+                <a16:creationId xmlns:a16="http://schemas.microsoft.com/office/drawing/2014/main" id="{10CBE639-54AF-4A31-A39E-D6C6C637E876}"/>
               </a:ext>
             </a:extLst>
           </p:cNvPr>
@@ -5732,10 +5592,54 @@
         </p:nvSpPr>
         <p:spPr>
           <a:xfrm>
-            <a:off x="9003158" y="3756582"/>
-            <a:ext cx="529390" cy="473242"/>
-          </a:xfrm>
-          <a:prstGeom prst="rightArrow">
+            <a:off x="3040187" y="3255108"/>
+            <a:ext cx="953477" cy="863600"/>
+          </a:xfrm>
+          <a:prstGeom prst="flowChartMultidocument">
+            <a:avLst/>
+          </a:prstGeom>
+        </p:spPr>
+        <p:style>
+          <a:lnRef idx="2">
+            <a:schemeClr val="accent1"/>
+          </a:lnRef>
+          <a:fillRef idx="1">
+            <a:schemeClr val="lt1"/>
+          </a:fillRef>
+          <a:effectRef idx="0">
+            <a:schemeClr val="accent1"/>
+          </a:effectRef>
+          <a:fontRef idx="minor">
+            <a:schemeClr val="dk1"/>
+          </a:fontRef>
+        </p:style>
+        <p:txBody>
+          <a:bodyPr rtlCol="0" anchor="ctr"/>
+          <a:lstStyle/>
+          <a:p>
+            <a:pPr algn="ctr"/>
+            <a:endParaRPr lang="en-US" dirty="0"/>
+          </a:p>
+        </p:txBody>
+      </p:sp>
+      <p:sp>
+        <p:nvSpPr>
+          <p:cNvPr id="11" name="Flowchart: Process 10">
+            <a:extLst>
+              <a:ext uri="{FF2B5EF4-FFF2-40B4-BE49-F238E27FC236}">
+                <a16:creationId xmlns:a16="http://schemas.microsoft.com/office/drawing/2014/main" id="{90D209FA-0160-4FC1-A7BC-93C826CD03A3}"/>
+              </a:ext>
+            </a:extLst>
+          </p:cNvPr>
+          <p:cNvSpPr/>
+          <p:nvPr/>
+        </p:nvSpPr>
+        <p:spPr>
+          <a:xfrm>
+            <a:off x="359506" y="3071447"/>
+            <a:ext cx="1641765" cy="1047261"/>
+          </a:xfrm>
+          <a:prstGeom prst="flowChartProcess">
             <a:avLst/>
           </a:prstGeom>
         </p:spPr>
@@ -5760,16 +5664,90 @@
           <a:lstStyle/>
           <a:p>
             <a:pPr algn="ctr"/>
-            <a:endParaRPr lang="en-GB"/>
-          </a:p>
-        </p:txBody>
-      </p:sp>
-      <p:sp>
-        <p:nvSpPr>
-          <p:cNvPr id="14" name="Arrow: Right 13">
-            <a:extLst>
-              <a:ext uri="{FF2B5EF4-FFF2-40B4-BE49-F238E27FC236}">
-                <a16:creationId xmlns:a16="http://schemas.microsoft.com/office/drawing/2014/main" id="{65C538D5-0520-407D-AE4F-670D0A418C8A}"/>
+            <a:r>
+              <a:rPr lang="en-US" sz="1400" dirty="0" err="1"/>
+              <a:t>VepFolderProcessor</a:t>
+            </a:r>
+            <a:endParaRPr lang="en-US" sz="1400" dirty="0"/>
+          </a:p>
+        </p:txBody>
+      </p:sp>
+      <p:sp>
+        <p:nvSpPr>
+          <p:cNvPr id="3" name="TextBox 2">
+            <a:extLst>
+              <a:ext uri="{FF2B5EF4-FFF2-40B4-BE49-F238E27FC236}">
+                <a16:creationId xmlns:a16="http://schemas.microsoft.com/office/drawing/2014/main" id="{FCB5CE05-CB84-4817-A86D-E2BA796D88D0}"/>
+              </a:ext>
+            </a:extLst>
+          </p:cNvPr>
+          <p:cNvSpPr txBox="1"/>
+          <p:nvPr/>
+        </p:nvSpPr>
+        <p:spPr>
+          <a:xfrm>
+            <a:off x="2743203" y="2702115"/>
+            <a:ext cx="1880130" cy="369332"/>
+          </a:xfrm>
+          <a:prstGeom prst="rect">
+            <a:avLst/>
+          </a:prstGeom>
+          <a:noFill/>
+        </p:spPr>
+        <p:txBody>
+          <a:bodyPr wrap="none" rtlCol="0">
+            <a:spAutoFit/>
+          </a:bodyPr>
+          <a:lstStyle/>
+          <a:p>
+            <a:r>
+              <a:rPr lang="en-US" dirty="0"/>
+              <a:t>Chromosome files</a:t>
+            </a:r>
+          </a:p>
+        </p:txBody>
+      </p:sp>
+      <p:sp>
+        <p:nvSpPr>
+          <p:cNvPr id="6" name="TextBox 5">
+            <a:extLst>
+              <a:ext uri="{FF2B5EF4-FFF2-40B4-BE49-F238E27FC236}">
+                <a16:creationId xmlns:a16="http://schemas.microsoft.com/office/drawing/2014/main" id="{E7CF983F-01DA-44B9-8CC1-1DE38538265F}"/>
+              </a:ext>
+            </a:extLst>
+          </p:cNvPr>
+          <p:cNvSpPr txBox="1"/>
+          <p:nvPr/>
+        </p:nvSpPr>
+        <p:spPr>
+          <a:xfrm>
+            <a:off x="2743203" y="4190946"/>
+            <a:ext cx="1721112" cy="369332"/>
+          </a:xfrm>
+          <a:prstGeom prst="rect">
+            <a:avLst/>
+          </a:prstGeom>
+          <a:noFill/>
+        </p:spPr>
+        <p:txBody>
+          <a:bodyPr wrap="none" rtlCol="0">
+            <a:spAutoFit/>
+          </a:bodyPr>
+          <a:lstStyle/>
+          <a:p>
+            <a:r>
+              <a:rPr lang="en-US" dirty="0"/>
+              <a:t>SNPs to proteins</a:t>
+            </a:r>
+          </a:p>
+        </p:txBody>
+      </p:sp>
+      <p:sp>
+        <p:nvSpPr>
+          <p:cNvPr id="7" name="Arrow: Right 6">
+            <a:extLst>
+              <a:ext uri="{FF2B5EF4-FFF2-40B4-BE49-F238E27FC236}">
+                <a16:creationId xmlns:a16="http://schemas.microsoft.com/office/drawing/2014/main" id="{F223BA4D-3DA6-4644-82F0-BBB0A57192C5}"/>
               </a:ext>
             </a:extLst>
           </p:cNvPr>
@@ -5778,10 +5756,102 @@
         </p:nvSpPr>
         <p:spPr>
           <a:xfrm>
-            <a:off x="6885533" y="3756582"/>
+            <a:off x="2254356" y="3450287"/>
             <a:ext cx="529390" cy="473242"/>
           </a:xfrm>
           <a:prstGeom prst="rightArrow">
+            <a:avLst/>
+          </a:prstGeom>
+        </p:spPr>
+        <p:style>
+          <a:lnRef idx="2">
+            <a:schemeClr val="dk1">
+              <a:shade val="50000"/>
+            </a:schemeClr>
+          </a:lnRef>
+          <a:fillRef idx="1">
+            <a:schemeClr val="dk1"/>
+          </a:fillRef>
+          <a:effectRef idx="0">
+            <a:schemeClr val="dk1"/>
+          </a:effectRef>
+          <a:fontRef idx="minor">
+            <a:schemeClr val="lt1"/>
+          </a:fontRef>
+        </p:style>
+        <p:txBody>
+          <a:bodyPr rtlCol="0" anchor="ctr"/>
+          <a:lstStyle/>
+          <a:p>
+            <a:pPr algn="ctr"/>
+            <a:endParaRPr lang="en-GB"/>
+          </a:p>
+        </p:txBody>
+      </p:sp>
+      <p:sp>
+        <p:nvSpPr>
+          <p:cNvPr id="8" name="Arrow: Right 7">
+            <a:extLst>
+              <a:ext uri="{FF2B5EF4-FFF2-40B4-BE49-F238E27FC236}">
+                <a16:creationId xmlns:a16="http://schemas.microsoft.com/office/drawing/2014/main" id="{1324CA21-8EEC-4FBC-8BA2-7F352DC3831B}"/>
+              </a:ext>
+            </a:extLst>
+          </p:cNvPr>
+          <p:cNvSpPr/>
+          <p:nvPr/>
+        </p:nvSpPr>
+        <p:spPr>
+          <a:xfrm>
+            <a:off x="4376590" y="3421185"/>
+            <a:ext cx="529390" cy="473242"/>
+          </a:xfrm>
+          <a:prstGeom prst="rightArrow">
+            <a:avLst/>
+          </a:prstGeom>
+        </p:spPr>
+        <p:style>
+          <a:lnRef idx="2">
+            <a:schemeClr val="dk1">
+              <a:shade val="50000"/>
+            </a:schemeClr>
+          </a:lnRef>
+          <a:fillRef idx="1">
+            <a:schemeClr val="dk1"/>
+          </a:fillRef>
+          <a:effectRef idx="0">
+            <a:schemeClr val="dk1"/>
+          </a:effectRef>
+          <a:fontRef idx="minor">
+            <a:schemeClr val="lt1"/>
+          </a:fontRef>
+        </p:style>
+        <p:txBody>
+          <a:bodyPr rtlCol="0" anchor="ctr"/>
+          <a:lstStyle/>
+          <a:p>
+            <a:pPr algn="ctr"/>
+            <a:endParaRPr lang="en-GB"/>
+          </a:p>
+        </p:txBody>
+      </p:sp>
+      <p:sp>
+        <p:nvSpPr>
+          <p:cNvPr id="9" name="Flowchart: Process 8">
+            <a:extLst>
+              <a:ext uri="{FF2B5EF4-FFF2-40B4-BE49-F238E27FC236}">
+                <a16:creationId xmlns:a16="http://schemas.microsoft.com/office/drawing/2014/main" id="{710F84E9-DDD7-4C83-8AD5-F08C2E16A856}"/>
+              </a:ext>
+            </a:extLst>
+          </p:cNvPr>
+          <p:cNvSpPr/>
+          <p:nvPr/>
+        </p:nvSpPr>
+        <p:spPr>
+          <a:xfrm>
+            <a:off x="5159065" y="3071446"/>
+            <a:ext cx="1703755" cy="1047261"/>
+          </a:xfrm>
+          <a:prstGeom prst="flowChartProcess">
             <a:avLst/>
           </a:prstGeom>
         </p:spPr>
@@ -5806,16 +5876,26 @@
           <a:lstStyle/>
           <a:p>
             <a:pPr algn="ctr"/>
-            <a:endParaRPr lang="en-GB"/>
-          </a:p>
-        </p:txBody>
-      </p:sp>
-      <p:sp>
-        <p:nvSpPr>
-          <p:cNvPr id="15" name="Arrow: Right 14">
-            <a:extLst>
-              <a:ext uri="{FF2B5EF4-FFF2-40B4-BE49-F238E27FC236}">
-                <a16:creationId xmlns:a16="http://schemas.microsoft.com/office/drawing/2014/main" id="{E44B5301-BDA2-455E-B288-D5EC4A1B70AC}"/>
+            <a:r>
+              <a:rPr lang="en-US" sz="1400" dirty="0"/>
+              <a:t>Neo4j</a:t>
+            </a:r>
+          </a:p>
+          <a:p>
+            <a:pPr algn="ctr"/>
+            <a:r>
+              <a:rPr lang="en-US" sz="1400" dirty="0"/>
+              <a:t>Extractor</a:t>
+            </a:r>
+          </a:p>
+        </p:txBody>
+      </p:sp>
+      <p:sp>
+        <p:nvSpPr>
+          <p:cNvPr id="12" name="Flowchart: Multidocument 11">
+            <a:extLst>
+              <a:ext uri="{FF2B5EF4-FFF2-40B4-BE49-F238E27FC236}">
+                <a16:creationId xmlns:a16="http://schemas.microsoft.com/office/drawing/2014/main" id="{B9B0E5CD-2BC2-442A-A1D3-520C877A689E}"/>
               </a:ext>
             </a:extLst>
           </p:cNvPr>
@@ -5823,11 +5903,229 @@
           <p:nvPr/>
         </p:nvSpPr>
         <p:spPr>
-          <a:xfrm rot="18929173">
-            <a:off x="4876852" y="4422651"/>
+          <a:xfrm>
+            <a:off x="7901765" y="3235568"/>
+            <a:ext cx="953477" cy="863600"/>
+          </a:xfrm>
+          <a:prstGeom prst="flowChartMultidocument">
+            <a:avLst/>
+          </a:prstGeom>
+        </p:spPr>
+        <p:style>
+          <a:lnRef idx="2">
+            <a:schemeClr val="accent1"/>
+          </a:lnRef>
+          <a:fillRef idx="1">
+            <a:schemeClr val="lt1"/>
+          </a:fillRef>
+          <a:effectRef idx="0">
+            <a:schemeClr val="accent1"/>
+          </a:effectRef>
+          <a:fontRef idx="minor">
+            <a:schemeClr val="dk1"/>
+          </a:fontRef>
+        </p:style>
+        <p:txBody>
+          <a:bodyPr rtlCol="0" anchor="ctr"/>
+          <a:lstStyle/>
+          <a:p>
+            <a:pPr algn="ctr"/>
+            <a:endParaRPr lang="en-US" dirty="0"/>
+          </a:p>
+        </p:txBody>
+      </p:sp>
+      <p:sp>
+        <p:nvSpPr>
+          <p:cNvPr id="13" name="Arrow: Right 12">
+            <a:extLst>
+              <a:ext uri="{FF2B5EF4-FFF2-40B4-BE49-F238E27FC236}">
+                <a16:creationId xmlns:a16="http://schemas.microsoft.com/office/drawing/2014/main" id="{86B04365-94B5-4AD7-BC5E-8DEC4D64C79B}"/>
+              </a:ext>
+            </a:extLst>
+          </p:cNvPr>
+          <p:cNvSpPr/>
+          <p:nvPr/>
+        </p:nvSpPr>
+        <p:spPr>
+          <a:xfrm>
+            <a:off x="7133857" y="3421185"/>
             <a:ext cx="529390" cy="473242"/>
           </a:xfrm>
           <a:prstGeom prst="rightArrow">
+            <a:avLst/>
+          </a:prstGeom>
+        </p:spPr>
+        <p:style>
+          <a:lnRef idx="2">
+            <a:schemeClr val="dk1">
+              <a:shade val="50000"/>
+            </a:schemeClr>
+          </a:lnRef>
+          <a:fillRef idx="1">
+            <a:schemeClr val="dk1"/>
+          </a:fillRef>
+          <a:effectRef idx="0">
+            <a:schemeClr val="dk1"/>
+          </a:effectRef>
+          <a:fontRef idx="minor">
+            <a:schemeClr val="lt1"/>
+          </a:fontRef>
+        </p:style>
+        <p:txBody>
+          <a:bodyPr rtlCol="0" anchor="ctr"/>
+          <a:lstStyle/>
+          <a:p>
+            <a:pPr algn="ctr"/>
+            <a:endParaRPr lang="en-GB"/>
+          </a:p>
+        </p:txBody>
+      </p:sp>
+      <p:sp>
+        <p:nvSpPr>
+          <p:cNvPr id="14" name="TextBox 13">
+            <a:extLst>
+              <a:ext uri="{FF2B5EF4-FFF2-40B4-BE49-F238E27FC236}">
+                <a16:creationId xmlns:a16="http://schemas.microsoft.com/office/drawing/2014/main" id="{DB129766-BDCF-457D-8486-30BF1F9372A4}"/>
+              </a:ext>
+            </a:extLst>
+          </p:cNvPr>
+          <p:cNvSpPr txBox="1"/>
+          <p:nvPr/>
+        </p:nvSpPr>
+        <p:spPr>
+          <a:xfrm>
+            <a:off x="7438438" y="2694299"/>
+            <a:ext cx="2010359" cy="369332"/>
+          </a:xfrm>
+          <a:prstGeom prst="rect">
+            <a:avLst/>
+          </a:prstGeom>
+          <a:noFill/>
+        </p:spPr>
+        <p:txBody>
+          <a:bodyPr wrap="none" rtlCol="0">
+            <a:spAutoFit/>
+          </a:bodyPr>
+          <a:lstStyle/>
+          <a:p>
+            <a:r>
+              <a:rPr lang="en-US" dirty="0"/>
+              <a:t>Static mapping files</a:t>
+            </a:r>
+          </a:p>
+        </p:txBody>
+      </p:sp>
+      <p:sp>
+        <p:nvSpPr>
+          <p:cNvPr id="15" name="TextBox 14">
+            <a:extLst>
+              <a:ext uri="{FF2B5EF4-FFF2-40B4-BE49-F238E27FC236}">
+                <a16:creationId xmlns:a16="http://schemas.microsoft.com/office/drawing/2014/main" id="{9B0F2AE3-283F-4905-9A85-E3A481C26F20}"/>
+              </a:ext>
+            </a:extLst>
+          </p:cNvPr>
+          <p:cNvSpPr txBox="1"/>
+          <p:nvPr/>
+        </p:nvSpPr>
+        <p:spPr>
+          <a:xfrm>
+            <a:off x="7766124" y="4187593"/>
+            <a:ext cx="1354986" cy="923330"/>
+          </a:xfrm>
+          <a:prstGeom prst="rect">
+            <a:avLst/>
+          </a:prstGeom>
+          <a:noFill/>
+        </p:spPr>
+        <p:txBody>
+          <a:bodyPr wrap="none" rtlCol="0">
+            <a:spAutoFit/>
+          </a:bodyPr>
+          <a:lstStyle/>
+          <a:p>
+            <a:r>
+              <a:rPr lang="en-US" dirty="0"/>
+              <a:t>Proteoforms</a:t>
+            </a:r>
+          </a:p>
+          <a:p>
+            <a:r>
+              <a:rPr lang="en-US" dirty="0"/>
+              <a:t>Reactions</a:t>
+            </a:r>
+          </a:p>
+          <a:p>
+            <a:r>
+              <a:rPr lang="en-US" dirty="0"/>
+              <a:t>Pathways…</a:t>
+            </a:r>
+          </a:p>
+        </p:txBody>
+      </p:sp>
+      <p:sp>
+        <p:nvSpPr>
+          <p:cNvPr id="16" name="Arrow: Right 15">
+            <a:extLst>
+              <a:ext uri="{FF2B5EF4-FFF2-40B4-BE49-F238E27FC236}">
+                <a16:creationId xmlns:a16="http://schemas.microsoft.com/office/drawing/2014/main" id="{0F0D74B3-E5D7-4116-A37C-71504E75EA43}"/>
+              </a:ext>
+            </a:extLst>
+          </p:cNvPr>
+          <p:cNvSpPr/>
+          <p:nvPr/>
+        </p:nvSpPr>
+        <p:spPr>
+          <a:xfrm>
+            <a:off x="9348577" y="3388991"/>
+            <a:ext cx="529390" cy="473242"/>
+          </a:xfrm>
+          <a:prstGeom prst="rightArrow">
+            <a:avLst/>
+          </a:prstGeom>
+        </p:spPr>
+        <p:style>
+          <a:lnRef idx="2">
+            <a:schemeClr val="dk1">
+              <a:shade val="50000"/>
+            </a:schemeClr>
+          </a:lnRef>
+          <a:fillRef idx="1">
+            <a:schemeClr val="dk1"/>
+          </a:fillRef>
+          <a:effectRef idx="0">
+            <a:schemeClr val="dk1"/>
+          </a:effectRef>
+          <a:fontRef idx="minor">
+            <a:schemeClr val="lt1"/>
+          </a:fontRef>
+        </p:style>
+        <p:txBody>
+          <a:bodyPr rtlCol="0" anchor="ctr"/>
+          <a:lstStyle/>
+          <a:p>
+            <a:pPr algn="ctr"/>
+            <a:endParaRPr lang="en-GB"/>
+          </a:p>
+        </p:txBody>
+      </p:sp>
+      <p:sp>
+        <p:nvSpPr>
+          <p:cNvPr id="17" name="Flowchart: Process 16">
+            <a:extLst>
+              <a:ext uri="{FF2B5EF4-FFF2-40B4-BE49-F238E27FC236}">
+                <a16:creationId xmlns:a16="http://schemas.microsoft.com/office/drawing/2014/main" id="{1A0114C5-0A76-492A-874E-5495F94F3058}"/>
+              </a:ext>
+            </a:extLst>
+          </p:cNvPr>
+          <p:cNvSpPr/>
+          <p:nvPr/>
+        </p:nvSpPr>
+        <p:spPr>
+          <a:xfrm>
+            <a:off x="10133999" y="3101981"/>
+            <a:ext cx="1703755" cy="1047261"/>
+          </a:xfrm>
+          <a:prstGeom prst="flowChartProcess">
             <a:avLst/>
           </a:prstGeom>
         </p:spPr>
@@ -5852,151 +6150,17 @@
           <a:lstStyle/>
           <a:p>
             <a:pPr algn="ctr"/>
-            <a:endParaRPr lang="en-GB"/>
-          </a:p>
-        </p:txBody>
-      </p:sp>
-      <p:sp>
-        <p:nvSpPr>
-          <p:cNvPr id="16" name="Arrow: Right 15">
-            <a:extLst>
-              <a:ext uri="{FF2B5EF4-FFF2-40B4-BE49-F238E27FC236}">
-                <a16:creationId xmlns:a16="http://schemas.microsoft.com/office/drawing/2014/main" id="{8E0F715B-CEED-4FF4-ADAA-D912DED2C3EE}"/>
-              </a:ext>
-            </a:extLst>
-          </p:cNvPr>
-          <p:cNvSpPr/>
-          <p:nvPr/>
-        </p:nvSpPr>
-        <p:spPr>
-          <a:xfrm rot="1702888">
-            <a:off x="4854618" y="3431029"/>
-            <a:ext cx="529390" cy="473242"/>
-          </a:xfrm>
-          <a:prstGeom prst="rightArrow">
-            <a:avLst/>
-          </a:prstGeom>
-        </p:spPr>
-        <p:style>
-          <a:lnRef idx="2">
-            <a:schemeClr val="accent1">
-              <a:shade val="50000"/>
-            </a:schemeClr>
-          </a:lnRef>
-          <a:fillRef idx="1">
-            <a:schemeClr val="accent1"/>
-          </a:fillRef>
-          <a:effectRef idx="0">
-            <a:schemeClr val="accent1"/>
-          </a:effectRef>
-          <a:fontRef idx="minor">
-            <a:schemeClr val="lt1"/>
-          </a:fontRef>
-        </p:style>
-        <p:txBody>
-          <a:bodyPr rtlCol="0" anchor="ctr"/>
-          <a:lstStyle/>
-          <a:p>
-            <a:pPr algn="ctr"/>
-            <a:endParaRPr lang="en-GB"/>
-          </a:p>
-        </p:txBody>
-      </p:sp>
-      <p:sp>
-        <p:nvSpPr>
-          <p:cNvPr id="17" name="Arrow: Right 16">
-            <a:extLst>
-              <a:ext uri="{FF2B5EF4-FFF2-40B4-BE49-F238E27FC236}">
-                <a16:creationId xmlns:a16="http://schemas.microsoft.com/office/drawing/2014/main" id="{C2B0A06C-478F-4C4E-8ABC-49DD9D16BC67}"/>
-              </a:ext>
-            </a:extLst>
-          </p:cNvPr>
-          <p:cNvSpPr/>
-          <p:nvPr/>
-        </p:nvSpPr>
-        <p:spPr>
-          <a:xfrm>
-            <a:off x="2738445" y="4577258"/>
-            <a:ext cx="529390" cy="473242"/>
-          </a:xfrm>
-          <a:prstGeom prst="rightArrow">
-            <a:avLst/>
-          </a:prstGeom>
-        </p:spPr>
-        <p:style>
-          <a:lnRef idx="2">
-            <a:schemeClr val="accent1">
-              <a:shade val="50000"/>
-            </a:schemeClr>
-          </a:lnRef>
-          <a:fillRef idx="1">
-            <a:schemeClr val="accent1"/>
-          </a:fillRef>
-          <a:effectRef idx="0">
-            <a:schemeClr val="accent1"/>
-          </a:effectRef>
-          <a:fontRef idx="minor">
-            <a:schemeClr val="lt1"/>
-          </a:fontRef>
-        </p:style>
-        <p:txBody>
-          <a:bodyPr rtlCol="0" anchor="ctr"/>
-          <a:lstStyle/>
-          <a:p>
-            <a:pPr algn="ctr"/>
-            <a:endParaRPr lang="en-GB"/>
-          </a:p>
-        </p:txBody>
-      </p:sp>
-      <p:sp>
-        <p:nvSpPr>
-          <p:cNvPr id="18" name="Right Brace 17">
-            <a:extLst>
-              <a:ext uri="{FF2B5EF4-FFF2-40B4-BE49-F238E27FC236}">
-                <a16:creationId xmlns:a16="http://schemas.microsoft.com/office/drawing/2014/main" id="{F7066981-7F32-458A-A036-D8684C6FC1B6}"/>
-              </a:ext>
-            </a:extLst>
-          </p:cNvPr>
-          <p:cNvSpPr/>
-          <p:nvPr/>
-        </p:nvSpPr>
-        <p:spPr>
-          <a:xfrm>
-            <a:off x="4268161" y="2696492"/>
-            <a:ext cx="251124" cy="1451017"/>
-          </a:xfrm>
-          <a:prstGeom prst="rightBrace">
-            <a:avLst/>
-          </a:prstGeom>
-          <a:ln w="38100"/>
-        </p:spPr>
-        <p:style>
-          <a:lnRef idx="1">
-            <a:schemeClr val="accent1"/>
-          </a:lnRef>
-          <a:fillRef idx="0">
-            <a:schemeClr val="accent1"/>
-          </a:fillRef>
-          <a:effectRef idx="0">
-            <a:schemeClr val="accent1"/>
-          </a:effectRef>
-          <a:fontRef idx="minor">
-            <a:schemeClr val="tx1"/>
-          </a:fontRef>
-        </p:style>
-        <p:txBody>
-          <a:bodyPr rtlCol="0" anchor="ctr"/>
-          <a:lstStyle/>
-          <a:p>
-            <a:pPr algn="ctr"/>
-            <a:endParaRPr lang="en-GB"/>
+            <a:r>
+              <a:rPr lang="en-US" sz="1400" dirty="0"/>
+              <a:t>PathwayMatcher</a:t>
+            </a:r>
           </a:p>
         </p:txBody>
       </p:sp>
     </p:spTree>
     <p:extLst>
       <p:ext uri="{BB962C8B-B14F-4D97-AF65-F5344CB8AC3E}">
-        <p14:creationId xmlns:p14="http://schemas.microsoft.com/office/powerpoint/2010/main" val="534751654"/>
+        <p14:creationId xmlns:p14="http://schemas.microsoft.com/office/powerpoint/2010/main" val="1259480858"/>
       </p:ext>
     </p:extLst>
   </p:cSld>
@@ -6028,7 +6192,7 @@
           <p:cNvPr id="2" name="Title 1">
             <a:extLst>
               <a:ext uri="{FF2B5EF4-FFF2-40B4-BE49-F238E27FC236}">
-                <a16:creationId xmlns:a16="http://schemas.microsoft.com/office/drawing/2014/main" id="{C165EFA6-408F-43D2-AE9D-CC9571C92781}"/>
+                <a16:creationId xmlns:a16="http://schemas.microsoft.com/office/drawing/2014/main" id="{FCF67970-C05E-4B41-82A0-B882EBC7031B}"/>
               </a:ext>
             </a:extLst>
           </p:cNvPr>
@@ -6045,112 +6209,18 @@
           <a:lstStyle/>
           <a:p>
             <a:r>
-              <a:rPr lang="en-US" dirty="0"/>
-              <a:t>Reference data extraction</a:t>
-            </a:r>
-          </a:p>
-        </p:txBody>
-      </p:sp>
-      <p:sp>
-        <p:nvSpPr>
-          <p:cNvPr id="10" name="Flowchart: Multidocument 9">
-            <a:extLst>
-              <a:ext uri="{FF2B5EF4-FFF2-40B4-BE49-F238E27FC236}">
-                <a16:creationId xmlns:a16="http://schemas.microsoft.com/office/drawing/2014/main" id="{10CBE639-54AF-4A31-A39E-D6C6C637E876}"/>
-              </a:ext>
-            </a:extLst>
-          </p:cNvPr>
-          <p:cNvSpPr/>
-          <p:nvPr/>
-        </p:nvSpPr>
-        <p:spPr>
-          <a:xfrm>
-            <a:off x="3040187" y="3255108"/>
-            <a:ext cx="953477" cy="863600"/>
-          </a:xfrm>
-          <a:prstGeom prst="flowChartMultidocument">
-            <a:avLst/>
-          </a:prstGeom>
-        </p:spPr>
-        <p:style>
-          <a:lnRef idx="2">
-            <a:schemeClr val="accent1"/>
-          </a:lnRef>
-          <a:fillRef idx="1">
-            <a:schemeClr val="lt1"/>
-          </a:fillRef>
-          <a:effectRef idx="0">
-            <a:schemeClr val="accent1"/>
-          </a:effectRef>
-          <a:fontRef idx="minor">
-            <a:schemeClr val="dk1"/>
-          </a:fontRef>
-        </p:style>
-        <p:txBody>
-          <a:bodyPr rtlCol="0" anchor="ctr"/>
-          <a:lstStyle/>
-          <a:p>
-            <a:pPr algn="ctr"/>
-            <a:endParaRPr lang="en-US" dirty="0"/>
-          </a:p>
-        </p:txBody>
-      </p:sp>
-      <p:sp>
-        <p:nvSpPr>
-          <p:cNvPr id="11" name="Flowchart: Process 10">
-            <a:extLst>
-              <a:ext uri="{FF2B5EF4-FFF2-40B4-BE49-F238E27FC236}">
-                <a16:creationId xmlns:a16="http://schemas.microsoft.com/office/drawing/2014/main" id="{90D209FA-0160-4FC1-A7BC-93C826CD03A3}"/>
-              </a:ext>
-            </a:extLst>
-          </p:cNvPr>
-          <p:cNvSpPr/>
-          <p:nvPr/>
-        </p:nvSpPr>
-        <p:spPr>
-          <a:xfrm>
-            <a:off x="359506" y="3071447"/>
-            <a:ext cx="1641765" cy="1047261"/>
-          </a:xfrm>
-          <a:prstGeom prst="flowChartProcess">
-            <a:avLst/>
-          </a:prstGeom>
-        </p:spPr>
-        <p:style>
-          <a:lnRef idx="2">
-            <a:schemeClr val="accent1">
-              <a:shade val="50000"/>
-            </a:schemeClr>
-          </a:lnRef>
-          <a:fillRef idx="1">
-            <a:schemeClr val="accent1"/>
-          </a:fillRef>
-          <a:effectRef idx="0">
-            <a:schemeClr val="accent1"/>
-          </a:effectRef>
-          <a:fontRef idx="minor">
-            <a:schemeClr val="lt1"/>
-          </a:fontRef>
-        </p:style>
-        <p:txBody>
-          <a:bodyPr rtlCol="0" anchor="ctr"/>
-          <a:lstStyle/>
-          <a:p>
-            <a:pPr algn="ctr"/>
-            <a:r>
-              <a:rPr lang="en-US" sz="1400" dirty="0" err="1"/>
-              <a:t>VepFolderProcessor</a:t>
-            </a:r>
-            <a:endParaRPr lang="en-US" sz="1400" dirty="0"/>
-          </a:p>
-        </p:txBody>
-      </p:sp>
-      <p:sp>
-        <p:nvSpPr>
-          <p:cNvPr id="3" name="TextBox 2">
-            <a:extLst>
-              <a:ext uri="{FF2B5EF4-FFF2-40B4-BE49-F238E27FC236}">
-                <a16:creationId xmlns:a16="http://schemas.microsoft.com/office/drawing/2014/main" id="{FCB5CE05-CB84-4817-A86D-E2BA796D88D0}"/>
+              <a:rPr lang="en-GB" dirty="0"/>
+              <a:t>Static mappings for pathway search</a:t>
+            </a:r>
+          </a:p>
+        </p:txBody>
+      </p:sp>
+      <p:sp>
+        <p:nvSpPr>
+          <p:cNvPr id="5" name="TextBox 4">
+            <a:extLst>
+              <a:ext uri="{FF2B5EF4-FFF2-40B4-BE49-F238E27FC236}">
+                <a16:creationId xmlns:a16="http://schemas.microsoft.com/office/drawing/2014/main" id="{01228489-03B4-4D65-88E6-3A4DD8FB244C}"/>
               </a:ext>
             </a:extLst>
           </p:cNvPr>
@@ -6159,8 +6229,48 @@
         </p:nvSpPr>
         <p:spPr>
           <a:xfrm>
-            <a:off x="2743203" y="2702115"/>
-            <a:ext cx="1880130" cy="369332"/>
+            <a:off x="1580328" y="3121588"/>
+            <a:ext cx="1217230" cy="369332"/>
+          </a:xfrm>
+          <a:prstGeom prst="rect">
+            <a:avLst/>
+          </a:prstGeom>
+          <a:noFill/>
+        </p:spPr>
+        <p:txBody>
+          <a:bodyPr wrap="square" rtlCol="0">
+            <a:spAutoFit/>
+          </a:bodyPr>
+          <a:lstStyle/>
+          <a:p>
+            <a:r>
+              <a:rPr lang="en-GB" dirty="0"/>
+              <a:t>SNP: </a:t>
+            </a:r>
+            <a:r>
+              <a:rPr lang="en-GB" dirty="0" err="1"/>
+              <a:t>rsIds</a:t>
+            </a:r>
+            <a:endParaRPr lang="en-GB" dirty="0"/>
+          </a:p>
+        </p:txBody>
+      </p:sp>
+      <p:sp>
+        <p:nvSpPr>
+          <p:cNvPr id="8" name="TextBox 7">
+            <a:extLst>
+              <a:ext uri="{FF2B5EF4-FFF2-40B4-BE49-F238E27FC236}">
+                <a16:creationId xmlns:a16="http://schemas.microsoft.com/office/drawing/2014/main" id="{DB84A4BA-3834-4DB7-BD30-E03A02C44181}"/>
+              </a:ext>
+            </a:extLst>
+          </p:cNvPr>
+          <p:cNvSpPr txBox="1"/>
+          <p:nvPr/>
+        </p:nvSpPr>
+        <p:spPr>
+          <a:xfrm>
+            <a:off x="1802458" y="4687981"/>
+            <a:ext cx="772969" cy="369332"/>
           </a:xfrm>
           <a:prstGeom prst="rect">
             <a:avLst/>
@@ -6174,18 +6284,18 @@
           <a:lstStyle/>
           <a:p>
             <a:r>
-              <a:rPr lang="en-US" dirty="0"/>
-              <a:t>Chromosome files</a:t>
-            </a:r>
-          </a:p>
-        </p:txBody>
-      </p:sp>
-      <p:sp>
-        <p:nvSpPr>
-          <p:cNvPr id="6" name="TextBox 5">
-            <a:extLst>
-              <a:ext uri="{FF2B5EF4-FFF2-40B4-BE49-F238E27FC236}">
-                <a16:creationId xmlns:a16="http://schemas.microsoft.com/office/drawing/2014/main" id="{E7CF983F-01DA-44B9-8CC1-1DE38538265F}"/>
+              <a:rPr lang="en-GB" dirty="0"/>
+              <a:t>Genes</a:t>
+            </a:r>
+          </a:p>
+        </p:txBody>
+      </p:sp>
+      <p:sp>
+        <p:nvSpPr>
+          <p:cNvPr id="9" name="TextBox 8">
+            <a:extLst>
+              <a:ext uri="{FF2B5EF4-FFF2-40B4-BE49-F238E27FC236}">
+                <a16:creationId xmlns:a16="http://schemas.microsoft.com/office/drawing/2014/main" id="{23C510E2-9F59-466E-8097-8F3DB5230263}"/>
               </a:ext>
             </a:extLst>
           </p:cNvPr>
@@ -6194,8 +6304,8 @@
         </p:nvSpPr>
         <p:spPr>
           <a:xfrm>
-            <a:off x="2743203" y="4190946"/>
-            <a:ext cx="1721112" cy="369332"/>
+            <a:off x="3686807" y="3602091"/>
+            <a:ext cx="1172116" cy="923330"/>
           </a:xfrm>
           <a:prstGeom prst="rect">
             <a:avLst/>
@@ -6208,19 +6318,143 @@
           </a:bodyPr>
           <a:lstStyle/>
           <a:p>
-            <a:r>
-              <a:rPr lang="en-US" dirty="0"/>
-              <a:t>SNPs to proteins</a:t>
-            </a:r>
-          </a:p>
-        </p:txBody>
-      </p:sp>
-      <p:sp>
-        <p:nvSpPr>
-          <p:cNvPr id="7" name="Arrow: Right 6">
-            <a:extLst>
-              <a:ext uri="{FF2B5EF4-FFF2-40B4-BE49-F238E27FC236}">
-                <a16:creationId xmlns:a16="http://schemas.microsoft.com/office/drawing/2014/main" id="{F223BA4D-3DA6-4644-82F0-BBB0A57192C5}"/>
+            <a:pPr algn="ctr"/>
+            <a:r>
+              <a:rPr lang="en-GB" dirty="0"/>
+              <a:t>Protein: </a:t>
+            </a:r>
+          </a:p>
+          <a:p>
+            <a:pPr algn="ctr"/>
+            <a:r>
+              <a:rPr lang="en-GB" dirty="0" err="1"/>
+              <a:t>UniProt</a:t>
+            </a:r>
+            <a:r>
+              <a:rPr lang="en-GB" dirty="0"/>
+              <a:t> </a:t>
+            </a:r>
+          </a:p>
+          <a:p>
+            <a:pPr algn="ctr"/>
+            <a:r>
+              <a:rPr lang="en-GB" dirty="0"/>
+              <a:t>accessions</a:t>
+            </a:r>
+          </a:p>
+        </p:txBody>
+      </p:sp>
+      <p:sp>
+        <p:nvSpPr>
+          <p:cNvPr id="10" name="TextBox 9">
+            <a:extLst>
+              <a:ext uri="{FF2B5EF4-FFF2-40B4-BE49-F238E27FC236}">
+                <a16:creationId xmlns:a16="http://schemas.microsoft.com/office/drawing/2014/main" id="{A644A67D-118C-4766-817B-8A37A06C6C20}"/>
+              </a:ext>
+            </a:extLst>
+          </p:cNvPr>
+          <p:cNvSpPr txBox="1"/>
+          <p:nvPr/>
+        </p:nvSpPr>
+        <p:spPr>
+          <a:xfrm>
+            <a:off x="4847188" y="5292775"/>
+            <a:ext cx="1354986" cy="369332"/>
+          </a:xfrm>
+          <a:prstGeom prst="rect">
+            <a:avLst/>
+          </a:prstGeom>
+          <a:noFill/>
+        </p:spPr>
+        <p:txBody>
+          <a:bodyPr wrap="none" rtlCol="0">
+            <a:spAutoFit/>
+          </a:bodyPr>
+          <a:lstStyle/>
+          <a:p>
+            <a:r>
+              <a:rPr lang="en-GB" dirty="0"/>
+              <a:t>Proteoforms</a:t>
+            </a:r>
+          </a:p>
+        </p:txBody>
+      </p:sp>
+      <p:sp>
+        <p:nvSpPr>
+          <p:cNvPr id="11" name="TextBox 10">
+            <a:extLst>
+              <a:ext uri="{FF2B5EF4-FFF2-40B4-BE49-F238E27FC236}">
+                <a16:creationId xmlns:a16="http://schemas.microsoft.com/office/drawing/2014/main" id="{2874E7D2-0CAC-4AD3-9C60-9DD49AACAC75}"/>
+              </a:ext>
+            </a:extLst>
+          </p:cNvPr>
+          <p:cNvSpPr txBox="1"/>
+          <p:nvPr/>
+        </p:nvSpPr>
+        <p:spPr>
+          <a:xfrm>
+            <a:off x="6267631" y="3915049"/>
+            <a:ext cx="1092735" cy="369332"/>
+          </a:xfrm>
+          <a:prstGeom prst="rect">
+            <a:avLst/>
+          </a:prstGeom>
+          <a:noFill/>
+        </p:spPr>
+        <p:txBody>
+          <a:bodyPr wrap="none" rtlCol="0">
+            <a:spAutoFit/>
+          </a:bodyPr>
+          <a:lstStyle/>
+          <a:p>
+            <a:r>
+              <a:rPr lang="en-GB" dirty="0"/>
+              <a:t>Reactions</a:t>
+            </a:r>
+          </a:p>
+        </p:txBody>
+      </p:sp>
+      <p:sp>
+        <p:nvSpPr>
+          <p:cNvPr id="12" name="TextBox 11">
+            <a:extLst>
+              <a:ext uri="{FF2B5EF4-FFF2-40B4-BE49-F238E27FC236}">
+                <a16:creationId xmlns:a16="http://schemas.microsoft.com/office/drawing/2014/main" id="{9AF8A85F-A579-4F41-AD3A-9861AE5C7765}"/>
+              </a:ext>
+            </a:extLst>
+          </p:cNvPr>
+          <p:cNvSpPr txBox="1"/>
+          <p:nvPr/>
+        </p:nvSpPr>
+        <p:spPr>
+          <a:xfrm>
+            <a:off x="8036673" y="3915049"/>
+            <a:ext cx="1064715" cy="369332"/>
+          </a:xfrm>
+          <a:prstGeom prst="rect">
+            <a:avLst/>
+          </a:prstGeom>
+          <a:noFill/>
+        </p:spPr>
+        <p:txBody>
+          <a:bodyPr wrap="none" rtlCol="0">
+            <a:spAutoFit/>
+          </a:bodyPr>
+          <a:lstStyle/>
+          <a:p>
+            <a:r>
+              <a:rPr lang="en-GB" dirty="0"/>
+              <a:t>Pathways</a:t>
+            </a:r>
+          </a:p>
+        </p:txBody>
+      </p:sp>
+      <p:sp>
+        <p:nvSpPr>
+          <p:cNvPr id="13" name="Arrow: Right 12">
+            <a:extLst>
+              <a:ext uri="{FF2B5EF4-FFF2-40B4-BE49-F238E27FC236}">
+                <a16:creationId xmlns:a16="http://schemas.microsoft.com/office/drawing/2014/main" id="{4DD4A2CE-C362-4CFB-AEE0-2B390AD2D121}"/>
               </a:ext>
             </a:extLst>
           </p:cNvPr>
@@ -6229,7 +6463,7 @@
         </p:nvSpPr>
         <p:spPr>
           <a:xfrm>
-            <a:off x="2254356" y="3450287"/>
+            <a:off x="7441633" y="3865997"/>
             <a:ext cx="529390" cy="473242"/>
           </a:xfrm>
           <a:prstGeom prst="rightArrow">
@@ -6263,10 +6497,10 @@
       </p:sp>
       <p:sp>
         <p:nvSpPr>
-          <p:cNvPr id="8" name="Arrow: Right 7">
-            <a:extLst>
-              <a:ext uri="{FF2B5EF4-FFF2-40B4-BE49-F238E27FC236}">
-                <a16:creationId xmlns:a16="http://schemas.microsoft.com/office/drawing/2014/main" id="{1324CA21-8EEC-4FBC-8BA2-7F352DC3831B}"/>
+          <p:cNvPr id="14" name="Arrow: Right 13">
+            <a:extLst>
+              <a:ext uri="{FF2B5EF4-FFF2-40B4-BE49-F238E27FC236}">
+                <a16:creationId xmlns:a16="http://schemas.microsoft.com/office/drawing/2014/main" id="{65C538D5-0520-407D-AE4F-670D0A418C8A}"/>
               </a:ext>
             </a:extLst>
           </p:cNvPr>
@@ -6275,7 +6509,7 @@
         </p:nvSpPr>
         <p:spPr>
           <a:xfrm>
-            <a:off x="4376590" y="3421185"/>
+            <a:off x="5259986" y="3881671"/>
             <a:ext cx="529390" cy="473242"/>
           </a:xfrm>
           <a:prstGeom prst="rightArrow">
@@ -6309,10 +6543,10 @@
       </p:sp>
       <p:sp>
         <p:nvSpPr>
-          <p:cNvPr id="9" name="Flowchart: Process 8">
-            <a:extLst>
-              <a:ext uri="{FF2B5EF4-FFF2-40B4-BE49-F238E27FC236}">
-                <a16:creationId xmlns:a16="http://schemas.microsoft.com/office/drawing/2014/main" id="{710F84E9-DDD7-4C83-8AD5-F08C2E16A856}"/>
+          <p:cNvPr id="15" name="Arrow: Right 14">
+            <a:extLst>
+              <a:ext uri="{FF2B5EF4-FFF2-40B4-BE49-F238E27FC236}">
+                <a16:creationId xmlns:a16="http://schemas.microsoft.com/office/drawing/2014/main" id="{E44B5301-BDA2-455E-B288-D5EC4A1B70AC}"/>
               </a:ext>
             </a:extLst>
           </p:cNvPr>
@@ -6320,101 +6554,8 @@
           <p:nvPr/>
         </p:nvSpPr>
         <p:spPr>
-          <a:xfrm>
-            <a:off x="5159065" y="3071446"/>
-            <a:ext cx="1703755" cy="1047261"/>
-          </a:xfrm>
-          <a:prstGeom prst="flowChartProcess">
-            <a:avLst/>
-          </a:prstGeom>
-        </p:spPr>
-        <p:style>
-          <a:lnRef idx="2">
-            <a:schemeClr val="accent1">
-              <a:shade val="50000"/>
-            </a:schemeClr>
-          </a:lnRef>
-          <a:fillRef idx="1">
-            <a:schemeClr val="accent1"/>
-          </a:fillRef>
-          <a:effectRef idx="0">
-            <a:schemeClr val="accent1"/>
-          </a:effectRef>
-          <a:fontRef idx="minor">
-            <a:schemeClr val="lt1"/>
-          </a:fontRef>
-        </p:style>
-        <p:txBody>
-          <a:bodyPr rtlCol="0" anchor="ctr"/>
-          <a:lstStyle/>
-          <a:p>
-            <a:pPr algn="ctr"/>
-            <a:r>
-              <a:rPr lang="en-US" sz="1400" dirty="0"/>
-              <a:t>Extractor</a:t>
-            </a:r>
-          </a:p>
-        </p:txBody>
-      </p:sp>
-      <p:sp>
-        <p:nvSpPr>
-          <p:cNvPr id="12" name="Flowchart: Multidocument 11">
-            <a:extLst>
-              <a:ext uri="{FF2B5EF4-FFF2-40B4-BE49-F238E27FC236}">
-                <a16:creationId xmlns:a16="http://schemas.microsoft.com/office/drawing/2014/main" id="{B9B0E5CD-2BC2-442A-A1D3-520C877A689E}"/>
-              </a:ext>
-            </a:extLst>
-          </p:cNvPr>
-          <p:cNvSpPr/>
-          <p:nvPr/>
-        </p:nvSpPr>
-        <p:spPr>
-          <a:xfrm>
-            <a:off x="7901765" y="3235568"/>
-            <a:ext cx="953477" cy="863600"/>
-          </a:xfrm>
-          <a:prstGeom prst="flowChartMultidocument">
-            <a:avLst/>
-          </a:prstGeom>
-        </p:spPr>
-        <p:style>
-          <a:lnRef idx="2">
-            <a:schemeClr val="accent1"/>
-          </a:lnRef>
-          <a:fillRef idx="1">
-            <a:schemeClr val="lt1"/>
-          </a:fillRef>
-          <a:effectRef idx="0">
-            <a:schemeClr val="accent1"/>
-          </a:effectRef>
-          <a:fontRef idx="minor">
-            <a:schemeClr val="dk1"/>
-          </a:fontRef>
-        </p:style>
-        <p:txBody>
-          <a:bodyPr rtlCol="0" anchor="ctr"/>
-          <a:lstStyle/>
-          <a:p>
-            <a:pPr algn="ctr"/>
-            <a:endParaRPr lang="en-US" dirty="0"/>
-          </a:p>
-        </p:txBody>
-      </p:sp>
-      <p:sp>
-        <p:nvSpPr>
-          <p:cNvPr id="13" name="Arrow: Right 12">
-            <a:extLst>
-              <a:ext uri="{FF2B5EF4-FFF2-40B4-BE49-F238E27FC236}">
-                <a16:creationId xmlns:a16="http://schemas.microsoft.com/office/drawing/2014/main" id="{86B04365-94B5-4AD7-BC5E-8DEC4D64C79B}"/>
-              </a:ext>
-            </a:extLst>
-          </p:cNvPr>
-          <p:cNvSpPr/>
-          <p:nvPr/>
-        </p:nvSpPr>
-        <p:spPr>
-          <a:xfrm>
-            <a:off x="7133857" y="3421185"/>
+          <a:xfrm rot="18929173">
+            <a:off x="6060552" y="4636026"/>
             <a:ext cx="529390" cy="473242"/>
           </a:xfrm>
           <a:prstGeom prst="rightArrow">
@@ -6448,92 +6589,10 @@
       </p:sp>
       <p:sp>
         <p:nvSpPr>
-          <p:cNvPr id="14" name="TextBox 13">
-            <a:extLst>
-              <a:ext uri="{FF2B5EF4-FFF2-40B4-BE49-F238E27FC236}">
-                <a16:creationId xmlns:a16="http://schemas.microsoft.com/office/drawing/2014/main" id="{DB129766-BDCF-457D-8486-30BF1F9372A4}"/>
-              </a:ext>
-            </a:extLst>
-          </p:cNvPr>
-          <p:cNvSpPr txBox="1"/>
-          <p:nvPr/>
-        </p:nvSpPr>
-        <p:spPr>
-          <a:xfrm>
-            <a:off x="7438438" y="2694299"/>
-            <a:ext cx="2010359" cy="369332"/>
-          </a:xfrm>
-          <a:prstGeom prst="rect">
-            <a:avLst/>
-          </a:prstGeom>
-          <a:noFill/>
-        </p:spPr>
-        <p:txBody>
-          <a:bodyPr wrap="none" rtlCol="0">
-            <a:spAutoFit/>
-          </a:bodyPr>
-          <a:lstStyle/>
-          <a:p>
-            <a:r>
-              <a:rPr lang="en-US" dirty="0"/>
-              <a:t>Static mapping files</a:t>
-            </a:r>
-          </a:p>
-        </p:txBody>
-      </p:sp>
-      <p:sp>
-        <p:nvSpPr>
-          <p:cNvPr id="15" name="TextBox 14">
-            <a:extLst>
-              <a:ext uri="{FF2B5EF4-FFF2-40B4-BE49-F238E27FC236}">
-                <a16:creationId xmlns:a16="http://schemas.microsoft.com/office/drawing/2014/main" id="{9B0F2AE3-283F-4905-9A85-E3A481C26F20}"/>
-              </a:ext>
-            </a:extLst>
-          </p:cNvPr>
-          <p:cNvSpPr txBox="1"/>
-          <p:nvPr/>
-        </p:nvSpPr>
-        <p:spPr>
-          <a:xfrm>
-            <a:off x="7766124" y="4187593"/>
-            <a:ext cx="1354986" cy="923330"/>
-          </a:xfrm>
-          <a:prstGeom prst="rect">
-            <a:avLst/>
-          </a:prstGeom>
-          <a:noFill/>
-        </p:spPr>
-        <p:txBody>
-          <a:bodyPr wrap="none" rtlCol="0">
-            <a:spAutoFit/>
-          </a:bodyPr>
-          <a:lstStyle/>
-          <a:p>
-            <a:r>
-              <a:rPr lang="en-US" dirty="0"/>
-              <a:t>Proteoforms</a:t>
-            </a:r>
-          </a:p>
-          <a:p>
-            <a:r>
-              <a:rPr lang="en-US" dirty="0"/>
-              <a:t>Reactions</a:t>
-            </a:r>
-          </a:p>
-          <a:p>
-            <a:r>
-              <a:rPr lang="en-US" dirty="0"/>
-              <a:t>Pathways…</a:t>
-            </a:r>
-          </a:p>
-        </p:txBody>
-      </p:sp>
-      <p:sp>
-        <p:nvSpPr>
           <p:cNvPr id="16" name="Arrow: Right 15">
             <a:extLst>
               <a:ext uri="{FF2B5EF4-FFF2-40B4-BE49-F238E27FC236}">
-                <a16:creationId xmlns:a16="http://schemas.microsoft.com/office/drawing/2014/main" id="{0F0D74B3-E5D7-4116-A37C-71504E75EA43}"/>
+                <a16:creationId xmlns:a16="http://schemas.microsoft.com/office/drawing/2014/main" id="{8E0F715B-CEED-4FF4-ADAA-D912DED2C3EE}"/>
               </a:ext>
             </a:extLst>
           </p:cNvPr>
@@ -6542,7 +6601,7 @@
         </p:nvSpPr>
         <p:spPr>
           <a:xfrm>
-            <a:off x="9348577" y="3388991"/>
+            <a:off x="2871895" y="3827135"/>
             <a:ext cx="529390" cy="473242"/>
           </a:xfrm>
           <a:prstGeom prst="rightArrow">
@@ -6576,117 +6635,10 @@
       </p:sp>
       <p:sp>
         <p:nvSpPr>
-          <p:cNvPr id="17" name="Flowchart: Process 16">
-            <a:extLst>
-              <a:ext uri="{FF2B5EF4-FFF2-40B4-BE49-F238E27FC236}">
-                <a16:creationId xmlns:a16="http://schemas.microsoft.com/office/drawing/2014/main" id="{1A0114C5-0A76-492A-874E-5495F94F3058}"/>
-              </a:ext>
-            </a:extLst>
-          </p:cNvPr>
-          <p:cNvSpPr/>
-          <p:nvPr/>
-        </p:nvSpPr>
-        <p:spPr>
-          <a:xfrm>
-            <a:off x="10133999" y="3101981"/>
-            <a:ext cx="1703755" cy="1047261"/>
-          </a:xfrm>
-          <a:prstGeom prst="flowChartProcess">
-            <a:avLst/>
-          </a:prstGeom>
-        </p:spPr>
-        <p:style>
-          <a:lnRef idx="2">
-            <a:schemeClr val="accent1">
-              <a:shade val="50000"/>
-            </a:schemeClr>
-          </a:lnRef>
-          <a:fillRef idx="1">
-            <a:schemeClr val="accent1"/>
-          </a:fillRef>
-          <a:effectRef idx="0">
-            <a:schemeClr val="accent1"/>
-          </a:effectRef>
-          <a:fontRef idx="minor">
-            <a:schemeClr val="lt1"/>
-          </a:fontRef>
-        </p:style>
-        <p:txBody>
-          <a:bodyPr rtlCol="0" anchor="ctr"/>
-          <a:lstStyle/>
-          <a:p>
-            <a:pPr algn="ctr"/>
-            <a:r>
-              <a:rPr lang="en-US" sz="1400" dirty="0"/>
-              <a:t>PathwayMatcher</a:t>
-            </a:r>
-          </a:p>
-        </p:txBody>
-      </p:sp>
-    </p:spTree>
-    <p:extLst>
-      <p:ext uri="{BB962C8B-B14F-4D97-AF65-F5344CB8AC3E}">
-        <p14:creationId xmlns:p14="http://schemas.microsoft.com/office/powerpoint/2010/main" val="1259480858"/>
-      </p:ext>
-    </p:extLst>
-  </p:cSld>
-  <p:clrMapOvr>
-    <a:masterClrMapping/>
-  </p:clrMapOvr>
-</p:sld>
-</file>
-
-<file path=ppt/slides/slide8.xml><?xml version="1.0" encoding="utf-8"?>
-<p:sld xmlns:a="http://schemas.openxmlformats.org/drawingml/2006/main" xmlns:r="http://schemas.openxmlformats.org/officeDocument/2006/relationships" xmlns:p="http://schemas.openxmlformats.org/presentationml/2006/main">
-  <p:cSld>
-    <p:spTree>
-      <p:nvGrpSpPr>
-        <p:cNvPr id="1" name=""/>
-        <p:cNvGrpSpPr/>
-        <p:nvPr/>
-      </p:nvGrpSpPr>
-      <p:grpSpPr>
-        <a:xfrm>
-          <a:off x="0" y="0"/>
-          <a:ext cx="0" cy="0"/>
-          <a:chOff x="0" y="0"/>
-          <a:chExt cx="0" cy="0"/>
-        </a:xfrm>
-      </p:grpSpPr>
-      <p:sp>
-        <p:nvSpPr>
-          <p:cNvPr id="2" name="Title 1">
-            <a:extLst>
-              <a:ext uri="{FF2B5EF4-FFF2-40B4-BE49-F238E27FC236}">
-                <a16:creationId xmlns:a16="http://schemas.microsoft.com/office/drawing/2014/main" id="{FCF67970-C05E-4B41-82A0-B882EBC7031B}"/>
-              </a:ext>
-            </a:extLst>
-          </p:cNvPr>
-          <p:cNvSpPr>
-            <a:spLocks noGrp="1"/>
-          </p:cNvSpPr>
-          <p:nvPr>
-            <p:ph type="title"/>
-          </p:nvPr>
-        </p:nvSpPr>
-        <p:spPr/>
-        <p:txBody>
-          <a:bodyPr/>
-          <a:lstStyle/>
-          <a:p>
-            <a:r>
-              <a:rPr lang="en-GB" dirty="0"/>
-              <a:t>Static mappings for pathway search</a:t>
-            </a:r>
-          </a:p>
-        </p:txBody>
-      </p:sp>
-      <p:sp>
-        <p:nvSpPr>
-          <p:cNvPr id="5" name="TextBox 4">
-            <a:extLst>
-              <a:ext uri="{FF2B5EF4-FFF2-40B4-BE49-F238E27FC236}">
-                <a16:creationId xmlns:a16="http://schemas.microsoft.com/office/drawing/2014/main" id="{01228489-03B4-4D65-88E6-3A4DD8FB244C}"/>
+          <p:cNvPr id="19" name="TextBox 18">
+            <a:extLst>
+              <a:ext uri="{FF2B5EF4-FFF2-40B4-BE49-F238E27FC236}">
+                <a16:creationId xmlns:a16="http://schemas.microsoft.com/office/drawing/2014/main" id="{B5FB4BDE-23B7-4A01-8D5F-7F69840C9EE0}"/>
               </a:ext>
             </a:extLst>
           </p:cNvPr>
@@ -6695,48 +6647,8 @@
         </p:nvSpPr>
         <p:spPr>
           <a:xfrm>
-            <a:off x="1580328" y="3121588"/>
-            <a:ext cx="1217230" cy="369332"/>
-          </a:xfrm>
-          <a:prstGeom prst="rect">
-            <a:avLst/>
-          </a:prstGeom>
-          <a:noFill/>
-        </p:spPr>
-        <p:txBody>
-          <a:bodyPr wrap="square" rtlCol="0">
-            <a:spAutoFit/>
-          </a:bodyPr>
-          <a:lstStyle/>
-          <a:p>
-            <a:r>
-              <a:rPr lang="en-GB" dirty="0"/>
-              <a:t>SNP: </a:t>
-            </a:r>
-            <a:r>
-              <a:rPr lang="en-GB" dirty="0" err="1"/>
-              <a:t>rsIds</a:t>
-            </a:r>
-            <a:endParaRPr lang="en-GB" dirty="0"/>
-          </a:p>
-        </p:txBody>
-      </p:sp>
-      <p:sp>
-        <p:nvSpPr>
-          <p:cNvPr id="8" name="TextBox 7">
-            <a:extLst>
-              <a:ext uri="{FF2B5EF4-FFF2-40B4-BE49-F238E27FC236}">
-                <a16:creationId xmlns:a16="http://schemas.microsoft.com/office/drawing/2014/main" id="{DB84A4BA-3834-4DB7-BD30-E03A02C44181}"/>
-              </a:ext>
-            </a:extLst>
-          </p:cNvPr>
-          <p:cNvSpPr txBox="1"/>
-          <p:nvPr/>
-        </p:nvSpPr>
-        <p:spPr>
-          <a:xfrm>
-            <a:off x="1802458" y="4687981"/>
-            <a:ext cx="772969" cy="369332"/>
+            <a:off x="9670288" y="3767015"/>
+            <a:ext cx="1072858" cy="646331"/>
           </a:xfrm>
           <a:prstGeom prst="rect">
             <a:avLst/>
@@ -6751,176 +6663,23 @@
           <a:p>
             <a:r>
               <a:rPr lang="en-GB" dirty="0"/>
-              <a:t>Genes</a:t>
-            </a:r>
-          </a:p>
-        </p:txBody>
-      </p:sp>
-      <p:sp>
-        <p:nvSpPr>
-          <p:cNvPr id="9" name="TextBox 8">
-            <a:extLst>
-              <a:ext uri="{FF2B5EF4-FFF2-40B4-BE49-F238E27FC236}">
-                <a16:creationId xmlns:a16="http://schemas.microsoft.com/office/drawing/2014/main" id="{23C510E2-9F59-466E-8097-8F3DB5230263}"/>
-              </a:ext>
-            </a:extLst>
-          </p:cNvPr>
-          <p:cNvSpPr txBox="1"/>
-          <p:nvPr/>
-        </p:nvSpPr>
-        <p:spPr>
-          <a:xfrm>
-            <a:off x="3686807" y="3602091"/>
-            <a:ext cx="1172116" cy="923330"/>
-          </a:xfrm>
-          <a:prstGeom prst="rect">
-            <a:avLst/>
-          </a:prstGeom>
-          <a:noFill/>
-        </p:spPr>
-        <p:txBody>
-          <a:bodyPr wrap="none" rtlCol="0">
-            <a:spAutoFit/>
-          </a:bodyPr>
-          <a:lstStyle/>
-          <a:p>
-            <a:pPr algn="ctr"/>
+              <a:t>Top level</a:t>
+            </a:r>
+          </a:p>
+          <a:p>
             <a:r>
               <a:rPr lang="en-GB" dirty="0"/>
-              <a:t>Protein: </a:t>
-            </a:r>
-          </a:p>
-          <a:p>
-            <a:pPr algn="ctr"/>
-            <a:r>
-              <a:rPr lang="en-GB" dirty="0" err="1"/>
-              <a:t>UniProt</a:t>
-            </a:r>
-            <a:r>
-              <a:rPr lang="en-GB" dirty="0"/>
-              <a:t> </a:t>
-            </a:r>
-          </a:p>
-          <a:p>
-            <a:pPr algn="ctr"/>
-            <a:r>
-              <a:rPr lang="en-GB" dirty="0"/>
-              <a:t>accessions</a:t>
-            </a:r>
-          </a:p>
-        </p:txBody>
-      </p:sp>
-      <p:sp>
-        <p:nvSpPr>
-          <p:cNvPr id="10" name="TextBox 9">
-            <a:extLst>
-              <a:ext uri="{FF2B5EF4-FFF2-40B4-BE49-F238E27FC236}">
-                <a16:creationId xmlns:a16="http://schemas.microsoft.com/office/drawing/2014/main" id="{A644A67D-118C-4766-817B-8A37A06C6C20}"/>
-              </a:ext>
-            </a:extLst>
-          </p:cNvPr>
-          <p:cNvSpPr txBox="1"/>
-          <p:nvPr/>
-        </p:nvSpPr>
-        <p:spPr>
-          <a:xfrm>
-            <a:off x="4847188" y="5292775"/>
-            <a:ext cx="1354986" cy="369332"/>
-          </a:xfrm>
-          <a:prstGeom prst="rect">
-            <a:avLst/>
-          </a:prstGeom>
-          <a:noFill/>
-        </p:spPr>
-        <p:txBody>
-          <a:bodyPr wrap="none" rtlCol="0">
-            <a:spAutoFit/>
-          </a:bodyPr>
-          <a:lstStyle/>
-          <a:p>
-            <a:r>
-              <a:rPr lang="en-GB" dirty="0"/>
-              <a:t>Proteoforms</a:t>
-            </a:r>
-          </a:p>
-        </p:txBody>
-      </p:sp>
-      <p:sp>
-        <p:nvSpPr>
-          <p:cNvPr id="11" name="TextBox 10">
-            <a:extLst>
-              <a:ext uri="{FF2B5EF4-FFF2-40B4-BE49-F238E27FC236}">
-                <a16:creationId xmlns:a16="http://schemas.microsoft.com/office/drawing/2014/main" id="{2874E7D2-0CAC-4AD3-9C60-9DD49AACAC75}"/>
-              </a:ext>
-            </a:extLst>
-          </p:cNvPr>
-          <p:cNvSpPr txBox="1"/>
-          <p:nvPr/>
-        </p:nvSpPr>
-        <p:spPr>
-          <a:xfrm>
-            <a:off x="6267631" y="3915049"/>
-            <a:ext cx="1092735" cy="369332"/>
-          </a:xfrm>
-          <a:prstGeom prst="rect">
-            <a:avLst/>
-          </a:prstGeom>
-          <a:noFill/>
-        </p:spPr>
-        <p:txBody>
-          <a:bodyPr wrap="none" rtlCol="0">
-            <a:spAutoFit/>
-          </a:bodyPr>
-          <a:lstStyle/>
-          <a:p>
-            <a:r>
-              <a:rPr lang="en-GB" dirty="0"/>
-              <a:t>Reactions</a:t>
-            </a:r>
-          </a:p>
-        </p:txBody>
-      </p:sp>
-      <p:sp>
-        <p:nvSpPr>
-          <p:cNvPr id="12" name="TextBox 11">
-            <a:extLst>
-              <a:ext uri="{FF2B5EF4-FFF2-40B4-BE49-F238E27FC236}">
-                <a16:creationId xmlns:a16="http://schemas.microsoft.com/office/drawing/2014/main" id="{9AF8A85F-A579-4F41-AD3A-9861AE5C7765}"/>
-              </a:ext>
-            </a:extLst>
-          </p:cNvPr>
-          <p:cNvSpPr txBox="1"/>
-          <p:nvPr/>
-        </p:nvSpPr>
-        <p:spPr>
-          <a:xfrm>
-            <a:off x="8036673" y="3915049"/>
-            <a:ext cx="1064715" cy="369332"/>
-          </a:xfrm>
-          <a:prstGeom prst="rect">
-            <a:avLst/>
-          </a:prstGeom>
-          <a:noFill/>
-        </p:spPr>
-        <p:txBody>
-          <a:bodyPr wrap="none" rtlCol="0">
-            <a:spAutoFit/>
-          </a:bodyPr>
-          <a:lstStyle/>
-          <a:p>
-            <a:r>
-              <a:rPr lang="en-GB" dirty="0"/>
-              <a:t>Pathways</a:t>
-            </a:r>
-          </a:p>
-        </p:txBody>
-      </p:sp>
-      <p:sp>
-        <p:nvSpPr>
-          <p:cNvPr id="13" name="Arrow: Right 12">
-            <a:extLst>
-              <a:ext uri="{FF2B5EF4-FFF2-40B4-BE49-F238E27FC236}">
-                <a16:creationId xmlns:a16="http://schemas.microsoft.com/office/drawing/2014/main" id="{4DD4A2CE-C362-4CFB-AEE0-2B390AD2D121}"/>
+              <a:t>pathways</a:t>
+            </a:r>
+          </a:p>
+        </p:txBody>
+      </p:sp>
+      <p:sp>
+        <p:nvSpPr>
+          <p:cNvPr id="20" name="Arrow: Right 19">
+            <a:extLst>
+              <a:ext uri="{FF2B5EF4-FFF2-40B4-BE49-F238E27FC236}">
+                <a16:creationId xmlns:a16="http://schemas.microsoft.com/office/drawing/2014/main" id="{8E56E5F7-18A3-46B9-98D4-06F27A410428}"/>
               </a:ext>
             </a:extLst>
           </p:cNvPr>
@@ -6929,7 +6688,7 @@
         </p:nvSpPr>
         <p:spPr>
           <a:xfrm>
-            <a:off x="7441633" y="3865997"/>
+            <a:off x="9093134" y="3874444"/>
             <a:ext cx="529390" cy="473242"/>
           </a:xfrm>
           <a:prstGeom prst="rightArrow">
@@ -6963,10 +6722,10 @@
       </p:sp>
       <p:sp>
         <p:nvSpPr>
-          <p:cNvPr id="14" name="Arrow: Right 13">
-            <a:extLst>
-              <a:ext uri="{FF2B5EF4-FFF2-40B4-BE49-F238E27FC236}">
-                <a16:creationId xmlns:a16="http://schemas.microsoft.com/office/drawing/2014/main" id="{65C538D5-0520-407D-AE4F-670D0A418C8A}"/>
+          <p:cNvPr id="21" name="Arrow: Right 20">
+            <a:extLst>
+              <a:ext uri="{FF2B5EF4-FFF2-40B4-BE49-F238E27FC236}">
+                <a16:creationId xmlns:a16="http://schemas.microsoft.com/office/drawing/2014/main" id="{E388EE62-816D-40E7-BC95-E69CB6237FF3}"/>
               </a:ext>
             </a:extLst>
           </p:cNvPr>
@@ -6974,8 +6733,8 @@
           <p:nvPr/>
         </p:nvSpPr>
         <p:spPr>
-          <a:xfrm>
-            <a:off x="5259986" y="3881671"/>
+          <a:xfrm rot="2884881">
+            <a:off x="4371386" y="4701115"/>
             <a:ext cx="529390" cy="473242"/>
           </a:xfrm>
           <a:prstGeom prst="rightArrow">
@@ -7009,10 +6768,57 @@
       </p:sp>
       <p:sp>
         <p:nvSpPr>
-          <p:cNvPr id="15" name="Arrow: Right 14">
-            <a:extLst>
-              <a:ext uri="{FF2B5EF4-FFF2-40B4-BE49-F238E27FC236}">
-                <a16:creationId xmlns:a16="http://schemas.microsoft.com/office/drawing/2014/main" id="{E44B5301-BDA2-455E-B288-D5EC4A1B70AC}"/>
+          <p:cNvPr id="22" name="TextBox 21">
+            <a:extLst>
+              <a:ext uri="{FF2B5EF4-FFF2-40B4-BE49-F238E27FC236}">
+                <a16:creationId xmlns:a16="http://schemas.microsoft.com/office/drawing/2014/main" id="{F2EC0BBB-E20C-464D-A24C-1CAAEC9980AF}"/>
+              </a:ext>
+            </a:extLst>
+          </p:cNvPr>
+          <p:cNvSpPr txBox="1"/>
+          <p:nvPr/>
+        </p:nvSpPr>
+        <p:spPr>
+          <a:xfrm>
+            <a:off x="3671831" y="2082972"/>
+            <a:ext cx="1300356" cy="646331"/>
+          </a:xfrm>
+          <a:prstGeom prst="rect">
+            <a:avLst/>
+          </a:prstGeom>
+          <a:noFill/>
+        </p:spPr>
+        <p:txBody>
+          <a:bodyPr wrap="none" rtlCol="0">
+            <a:spAutoFit/>
+          </a:bodyPr>
+          <a:lstStyle/>
+          <a:p>
+            <a:pPr algn="ctr"/>
+            <a:r>
+              <a:rPr lang="en-GB" dirty="0"/>
+              <a:t>Protein: </a:t>
+            </a:r>
+          </a:p>
+          <a:p>
+            <a:pPr algn="ctr"/>
+            <a:r>
+              <a:rPr lang="en-GB" dirty="0" err="1"/>
+              <a:t>Ensembl</a:t>
+            </a:r>
+            <a:r>
+              <a:rPr lang="en-GB" dirty="0"/>
+              <a:t> ids</a:t>
+            </a:r>
+          </a:p>
+        </p:txBody>
+      </p:sp>
+      <p:sp>
+        <p:nvSpPr>
+          <p:cNvPr id="23" name="Arrow: Right 22">
+            <a:extLst>
+              <a:ext uri="{FF2B5EF4-FFF2-40B4-BE49-F238E27FC236}">
+                <a16:creationId xmlns:a16="http://schemas.microsoft.com/office/drawing/2014/main" id="{CD6A09F5-4933-4BD2-A792-505B9DECF054}"/>
               </a:ext>
             </a:extLst>
           </p:cNvPr>
@@ -7020,8 +6826,8 @@
           <p:nvPr/>
         </p:nvSpPr>
         <p:spPr>
-          <a:xfrm rot="18929173">
-            <a:off x="6060552" y="4636026"/>
+          <a:xfrm rot="19210321">
+            <a:off x="2887694" y="4415008"/>
             <a:ext cx="529390" cy="473242"/>
           </a:xfrm>
           <a:prstGeom prst="rightArrow">
@@ -7055,10 +6861,10 @@
       </p:sp>
       <p:sp>
         <p:nvSpPr>
-          <p:cNvPr id="16" name="Arrow: Right 15">
-            <a:extLst>
-              <a:ext uri="{FF2B5EF4-FFF2-40B4-BE49-F238E27FC236}">
-                <a16:creationId xmlns:a16="http://schemas.microsoft.com/office/drawing/2014/main" id="{8E0F715B-CEED-4FF4-ADAA-D912DED2C3EE}"/>
+          <p:cNvPr id="25" name="Arrow: Right 24">
+            <a:extLst>
+              <a:ext uri="{FF2B5EF4-FFF2-40B4-BE49-F238E27FC236}">
+                <a16:creationId xmlns:a16="http://schemas.microsoft.com/office/drawing/2014/main" id="{76FD8BBC-0B7D-4DA5-BADC-F7CACF8841BC}"/>
               </a:ext>
             </a:extLst>
           </p:cNvPr>
@@ -7066,8 +6872,8 @@
           <p:nvPr/>
         </p:nvSpPr>
         <p:spPr>
-          <a:xfrm>
-            <a:off x="2871895" y="3827135"/>
+          <a:xfrm rot="1760186">
+            <a:off x="2895846" y="3192102"/>
             <a:ext cx="529390" cy="473242"/>
           </a:xfrm>
           <a:prstGeom prst="rightArrow">
@@ -7101,10 +6907,10 @@
       </p:sp>
       <p:sp>
         <p:nvSpPr>
-          <p:cNvPr id="19" name="TextBox 18">
-            <a:extLst>
-              <a:ext uri="{FF2B5EF4-FFF2-40B4-BE49-F238E27FC236}">
-                <a16:creationId xmlns:a16="http://schemas.microsoft.com/office/drawing/2014/main" id="{B5FB4BDE-23B7-4A01-8D5F-7F69840C9EE0}"/>
+          <p:cNvPr id="26" name="TextBox 25">
+            <a:extLst>
+              <a:ext uri="{FF2B5EF4-FFF2-40B4-BE49-F238E27FC236}">
+                <a16:creationId xmlns:a16="http://schemas.microsoft.com/office/drawing/2014/main" id="{5DC44454-DFD0-4EB5-92DE-3CE8C5017452}"/>
               </a:ext>
             </a:extLst>
           </p:cNvPr>
@@ -7113,8 +6919,8 @@
         </p:nvSpPr>
         <p:spPr>
           <a:xfrm>
-            <a:off x="9670288" y="3767015"/>
-            <a:ext cx="1072858" cy="646331"/>
+            <a:off x="1413995" y="3914117"/>
+            <a:ext cx="1475816" cy="369332"/>
           </a:xfrm>
           <a:prstGeom prst="rect">
             <a:avLst/>
@@ -7122,30 +6928,32 @@
           <a:noFill/>
         </p:spPr>
         <p:txBody>
-          <a:bodyPr wrap="none" rtlCol="0">
+          <a:bodyPr wrap="square" rtlCol="0">
             <a:spAutoFit/>
           </a:bodyPr>
           <a:lstStyle/>
           <a:p>
             <a:r>
               <a:rPr lang="en-GB" dirty="0"/>
-              <a:t>Top level</a:t>
-            </a:r>
-          </a:p>
-          <a:p>
+              <a:t>SNP: </a:t>
+            </a:r>
+            <a:r>
+              <a:rPr lang="en-GB" dirty="0" err="1"/>
+              <a:t>Chr</a:t>
+            </a:r>
             <a:r>
               <a:rPr lang="en-GB" dirty="0"/>
-              <a:t>pathways</a:t>
-            </a:r>
-          </a:p>
-        </p:txBody>
-      </p:sp>
-      <p:sp>
-        <p:nvSpPr>
-          <p:cNvPr id="20" name="Arrow: Right 19">
-            <a:extLst>
-              <a:ext uri="{FF2B5EF4-FFF2-40B4-BE49-F238E27FC236}">
-                <a16:creationId xmlns:a16="http://schemas.microsoft.com/office/drawing/2014/main" id="{8E56E5F7-18A3-46B9-98D4-06F27A410428}"/>
+              <a:t>, bp</a:t>
+            </a:r>
+          </a:p>
+        </p:txBody>
+      </p:sp>
+      <p:sp>
+        <p:nvSpPr>
+          <p:cNvPr id="27" name="Arrow: Right 26">
+            <a:extLst>
+              <a:ext uri="{FF2B5EF4-FFF2-40B4-BE49-F238E27FC236}">
+                <a16:creationId xmlns:a16="http://schemas.microsoft.com/office/drawing/2014/main" id="{BC38687B-53C4-4847-8A4E-436079E067ED}"/>
               </a:ext>
             </a:extLst>
           </p:cNvPr>
@@ -7153,8 +6961,8 @@
           <p:nvPr/>
         </p:nvSpPr>
         <p:spPr>
-          <a:xfrm>
-            <a:off x="9093134" y="3874444"/>
+          <a:xfrm rot="5400000">
+            <a:off x="3996435" y="2856141"/>
             <a:ext cx="529390" cy="473242"/>
           </a:xfrm>
           <a:prstGeom prst="rightArrow">
@@ -7186,280 +6994,6 @@
           </a:p>
         </p:txBody>
       </p:sp>
-      <p:sp>
-        <p:nvSpPr>
-          <p:cNvPr id="21" name="Arrow: Right 20">
-            <a:extLst>
-              <a:ext uri="{FF2B5EF4-FFF2-40B4-BE49-F238E27FC236}">
-                <a16:creationId xmlns:a16="http://schemas.microsoft.com/office/drawing/2014/main" id="{E388EE62-816D-40E7-BC95-E69CB6237FF3}"/>
-              </a:ext>
-            </a:extLst>
-          </p:cNvPr>
-          <p:cNvSpPr/>
-          <p:nvPr/>
-        </p:nvSpPr>
-        <p:spPr>
-          <a:xfrm rot="2884881">
-            <a:off x="4371386" y="4701115"/>
-            <a:ext cx="529390" cy="473242"/>
-          </a:xfrm>
-          <a:prstGeom prst="rightArrow">
-            <a:avLst/>
-          </a:prstGeom>
-        </p:spPr>
-        <p:style>
-          <a:lnRef idx="2">
-            <a:schemeClr val="dk1">
-              <a:shade val="50000"/>
-            </a:schemeClr>
-          </a:lnRef>
-          <a:fillRef idx="1">
-            <a:schemeClr val="dk1"/>
-          </a:fillRef>
-          <a:effectRef idx="0">
-            <a:schemeClr val="dk1"/>
-          </a:effectRef>
-          <a:fontRef idx="minor">
-            <a:schemeClr val="lt1"/>
-          </a:fontRef>
-        </p:style>
-        <p:txBody>
-          <a:bodyPr rtlCol="0" anchor="ctr"/>
-          <a:lstStyle/>
-          <a:p>
-            <a:pPr algn="ctr"/>
-            <a:endParaRPr lang="en-GB"/>
-          </a:p>
-        </p:txBody>
-      </p:sp>
-      <p:sp>
-        <p:nvSpPr>
-          <p:cNvPr id="22" name="TextBox 21">
-            <a:extLst>
-              <a:ext uri="{FF2B5EF4-FFF2-40B4-BE49-F238E27FC236}">
-                <a16:creationId xmlns:a16="http://schemas.microsoft.com/office/drawing/2014/main" id="{F2EC0BBB-E20C-464D-A24C-1CAAEC9980AF}"/>
-              </a:ext>
-            </a:extLst>
-          </p:cNvPr>
-          <p:cNvSpPr txBox="1"/>
-          <p:nvPr/>
-        </p:nvSpPr>
-        <p:spPr>
-          <a:xfrm>
-            <a:off x="3671831" y="2082972"/>
-            <a:ext cx="1300356" cy="646331"/>
-          </a:xfrm>
-          <a:prstGeom prst="rect">
-            <a:avLst/>
-          </a:prstGeom>
-          <a:noFill/>
-        </p:spPr>
-        <p:txBody>
-          <a:bodyPr wrap="none" rtlCol="0">
-            <a:spAutoFit/>
-          </a:bodyPr>
-          <a:lstStyle/>
-          <a:p>
-            <a:pPr algn="ctr"/>
-            <a:r>
-              <a:rPr lang="en-GB" dirty="0"/>
-              <a:t>Protein: </a:t>
-            </a:r>
-          </a:p>
-          <a:p>
-            <a:pPr algn="ctr"/>
-            <a:r>
-              <a:rPr lang="en-GB" dirty="0" err="1"/>
-              <a:t>Ensembl</a:t>
-            </a:r>
-            <a:r>
-              <a:rPr lang="en-GB" dirty="0"/>
-              <a:t> ids</a:t>
-            </a:r>
-          </a:p>
-        </p:txBody>
-      </p:sp>
-      <p:sp>
-        <p:nvSpPr>
-          <p:cNvPr id="23" name="Arrow: Right 22">
-            <a:extLst>
-              <a:ext uri="{FF2B5EF4-FFF2-40B4-BE49-F238E27FC236}">
-                <a16:creationId xmlns:a16="http://schemas.microsoft.com/office/drawing/2014/main" id="{CD6A09F5-4933-4BD2-A792-505B9DECF054}"/>
-              </a:ext>
-            </a:extLst>
-          </p:cNvPr>
-          <p:cNvSpPr/>
-          <p:nvPr/>
-        </p:nvSpPr>
-        <p:spPr>
-          <a:xfrm rot="19210321">
-            <a:off x="2887694" y="4415008"/>
-            <a:ext cx="529390" cy="473242"/>
-          </a:xfrm>
-          <a:prstGeom prst="rightArrow">
-            <a:avLst/>
-          </a:prstGeom>
-        </p:spPr>
-        <p:style>
-          <a:lnRef idx="2">
-            <a:schemeClr val="dk1">
-              <a:shade val="50000"/>
-            </a:schemeClr>
-          </a:lnRef>
-          <a:fillRef idx="1">
-            <a:schemeClr val="dk1"/>
-          </a:fillRef>
-          <a:effectRef idx="0">
-            <a:schemeClr val="dk1"/>
-          </a:effectRef>
-          <a:fontRef idx="minor">
-            <a:schemeClr val="lt1"/>
-          </a:fontRef>
-        </p:style>
-        <p:txBody>
-          <a:bodyPr rtlCol="0" anchor="ctr"/>
-          <a:lstStyle/>
-          <a:p>
-            <a:pPr algn="ctr"/>
-            <a:endParaRPr lang="en-GB"/>
-          </a:p>
-        </p:txBody>
-      </p:sp>
-      <p:sp>
-        <p:nvSpPr>
-          <p:cNvPr id="25" name="Arrow: Right 24">
-            <a:extLst>
-              <a:ext uri="{FF2B5EF4-FFF2-40B4-BE49-F238E27FC236}">
-                <a16:creationId xmlns:a16="http://schemas.microsoft.com/office/drawing/2014/main" id="{76FD8BBC-0B7D-4DA5-BADC-F7CACF8841BC}"/>
-              </a:ext>
-            </a:extLst>
-          </p:cNvPr>
-          <p:cNvSpPr/>
-          <p:nvPr/>
-        </p:nvSpPr>
-        <p:spPr>
-          <a:xfrm rot="1760186">
-            <a:off x="2895846" y="3192102"/>
-            <a:ext cx="529390" cy="473242"/>
-          </a:xfrm>
-          <a:prstGeom prst="rightArrow">
-            <a:avLst/>
-          </a:prstGeom>
-        </p:spPr>
-        <p:style>
-          <a:lnRef idx="2">
-            <a:schemeClr val="dk1">
-              <a:shade val="50000"/>
-            </a:schemeClr>
-          </a:lnRef>
-          <a:fillRef idx="1">
-            <a:schemeClr val="dk1"/>
-          </a:fillRef>
-          <a:effectRef idx="0">
-            <a:schemeClr val="dk1"/>
-          </a:effectRef>
-          <a:fontRef idx="minor">
-            <a:schemeClr val="lt1"/>
-          </a:fontRef>
-        </p:style>
-        <p:txBody>
-          <a:bodyPr rtlCol="0" anchor="ctr"/>
-          <a:lstStyle/>
-          <a:p>
-            <a:pPr algn="ctr"/>
-            <a:endParaRPr lang="en-GB"/>
-          </a:p>
-        </p:txBody>
-      </p:sp>
-      <p:sp>
-        <p:nvSpPr>
-          <p:cNvPr id="26" name="TextBox 25">
-            <a:extLst>
-              <a:ext uri="{FF2B5EF4-FFF2-40B4-BE49-F238E27FC236}">
-                <a16:creationId xmlns:a16="http://schemas.microsoft.com/office/drawing/2014/main" id="{5DC44454-DFD0-4EB5-92DE-3CE8C5017452}"/>
-              </a:ext>
-            </a:extLst>
-          </p:cNvPr>
-          <p:cNvSpPr txBox="1"/>
-          <p:nvPr/>
-        </p:nvSpPr>
-        <p:spPr>
-          <a:xfrm>
-            <a:off x="1413995" y="3914117"/>
-            <a:ext cx="1475816" cy="369332"/>
-          </a:xfrm>
-          <a:prstGeom prst="rect">
-            <a:avLst/>
-          </a:prstGeom>
-          <a:noFill/>
-        </p:spPr>
-        <p:txBody>
-          <a:bodyPr wrap="square" rtlCol="0">
-            <a:spAutoFit/>
-          </a:bodyPr>
-          <a:lstStyle/>
-          <a:p>
-            <a:r>
-              <a:rPr lang="en-GB" dirty="0"/>
-              <a:t>SNP: </a:t>
-            </a:r>
-            <a:r>
-              <a:rPr lang="en-GB" dirty="0" err="1"/>
-              <a:t>Chr</a:t>
-            </a:r>
-            <a:r>
-              <a:rPr lang="en-GB" dirty="0"/>
-              <a:t>, bp</a:t>
-            </a:r>
-          </a:p>
-        </p:txBody>
-      </p:sp>
-      <p:sp>
-        <p:nvSpPr>
-          <p:cNvPr id="27" name="Arrow: Right 26">
-            <a:extLst>
-              <a:ext uri="{FF2B5EF4-FFF2-40B4-BE49-F238E27FC236}">
-                <a16:creationId xmlns:a16="http://schemas.microsoft.com/office/drawing/2014/main" id="{BC38687B-53C4-4847-8A4E-436079E067ED}"/>
-              </a:ext>
-            </a:extLst>
-          </p:cNvPr>
-          <p:cNvSpPr/>
-          <p:nvPr/>
-        </p:nvSpPr>
-        <p:spPr>
-          <a:xfrm rot="5400000">
-            <a:off x="3996435" y="2856141"/>
-            <a:ext cx="529390" cy="473242"/>
-          </a:xfrm>
-          <a:prstGeom prst="rightArrow">
-            <a:avLst/>
-          </a:prstGeom>
-        </p:spPr>
-        <p:style>
-          <a:lnRef idx="2">
-            <a:schemeClr val="dk1">
-              <a:shade val="50000"/>
-            </a:schemeClr>
-          </a:lnRef>
-          <a:fillRef idx="1">
-            <a:schemeClr val="dk1"/>
-          </a:fillRef>
-          <a:effectRef idx="0">
-            <a:schemeClr val="dk1"/>
-          </a:effectRef>
-          <a:fontRef idx="minor">
-            <a:schemeClr val="lt1"/>
-          </a:fontRef>
-        </p:style>
-        <p:txBody>
-          <a:bodyPr rtlCol="0" anchor="ctr"/>
-          <a:lstStyle/>
-          <a:p>
-            <a:pPr algn="ctr"/>
-            <a:endParaRPr lang="en-GB"/>
-          </a:p>
-        </p:txBody>
-      </p:sp>
     </p:spTree>
     <p:extLst>
       <p:ext uri="{BB962C8B-B14F-4D97-AF65-F5344CB8AC3E}">
@@ -7473,7 +7007,7 @@
 </p:sld>
 </file>
 
-<file path=ppt/slides/slide9.xml><?xml version="1.0" encoding="utf-8"?>
+<file path=ppt/slides/slide8.xml><?xml version="1.0" encoding="utf-8"?>
 <p:sld xmlns:a="http://schemas.openxmlformats.org/drawingml/2006/main" xmlns:r="http://schemas.openxmlformats.org/officeDocument/2006/relationships" xmlns:p="http://schemas.openxmlformats.org/presentationml/2006/main">
   <p:cSld>
     <p:spTree>
@@ -8960,6 +8494,117 @@
     <p:extLst>
       <p:ext uri="{BB962C8B-B14F-4D97-AF65-F5344CB8AC3E}">
         <p14:creationId xmlns:p14="http://schemas.microsoft.com/office/powerpoint/2010/main" val="361326781"/>
+      </p:ext>
+    </p:extLst>
+  </p:cSld>
+  <p:clrMapOvr>
+    <a:masterClrMapping/>
+  </p:clrMapOvr>
+</p:sld>
+</file>
+
+<file path=ppt/slides/slide9.xml><?xml version="1.0" encoding="utf-8"?>
+<p:sld xmlns:a="http://schemas.openxmlformats.org/drawingml/2006/main" xmlns:r="http://schemas.openxmlformats.org/officeDocument/2006/relationships" xmlns:p="http://schemas.openxmlformats.org/presentationml/2006/main">
+  <p:cSld>
+    <p:spTree>
+      <p:nvGrpSpPr>
+        <p:cNvPr id="1" name=""/>
+        <p:cNvGrpSpPr/>
+        <p:nvPr/>
+      </p:nvGrpSpPr>
+      <p:grpSpPr>
+        <a:xfrm>
+          <a:off x="0" y="0"/>
+          <a:ext cx="0" cy="0"/>
+          <a:chOff x="0" y="0"/>
+          <a:chExt cx="0" cy="0"/>
+        </a:xfrm>
+      </p:grpSpPr>
+      <p:sp>
+        <p:nvSpPr>
+          <p:cNvPr id="2" name="Title 1">
+            <a:extLst>
+              <a:ext uri="{FF2B5EF4-FFF2-40B4-BE49-F238E27FC236}">
+                <a16:creationId xmlns:a16="http://schemas.microsoft.com/office/drawing/2014/main" id="{D1780D6A-65BD-4677-AD2C-B1AB1A1EE579}"/>
+              </a:ext>
+            </a:extLst>
+          </p:cNvPr>
+          <p:cNvSpPr>
+            <a:spLocks noGrp="1"/>
+          </p:cNvSpPr>
+          <p:nvPr>
+            <p:ph type="title"/>
+          </p:nvPr>
+        </p:nvSpPr>
+        <p:spPr/>
+        <p:txBody>
+          <a:bodyPr/>
+          <a:lstStyle/>
+          <a:p>
+            <a:r>
+              <a:rPr lang="en-US" dirty="0"/>
+              <a:t>PathwayMatcher modules overview</a:t>
+            </a:r>
+          </a:p>
+        </p:txBody>
+      </p:sp>
+      <p:sp>
+        <p:nvSpPr>
+          <p:cNvPr id="4" name="Content Placeholder 3">
+            <a:extLst>
+              <a:ext uri="{FF2B5EF4-FFF2-40B4-BE49-F238E27FC236}">
+                <a16:creationId xmlns:a16="http://schemas.microsoft.com/office/drawing/2014/main" id="{A283084C-9884-4A38-B192-185B7A1D89E6}"/>
+              </a:ext>
+            </a:extLst>
+          </p:cNvPr>
+          <p:cNvSpPr>
+            <a:spLocks noGrp="1"/>
+          </p:cNvSpPr>
+          <p:nvPr>
+            <p:ph idx="1"/>
+          </p:nvPr>
+        </p:nvSpPr>
+        <p:spPr>
+          <a:xfrm>
+            <a:off x="838200" y="1825625"/>
+            <a:ext cx="10515600" cy="4351338"/>
+          </a:xfrm>
+          <a:prstGeom prst="flowChartProcess">
+            <a:avLst/>
+          </a:prstGeom>
+        </p:spPr>
+        <p:style>
+          <a:lnRef idx="2">
+            <a:schemeClr val="accent1">
+              <a:shade val="50000"/>
+            </a:schemeClr>
+          </a:lnRef>
+          <a:fillRef idx="1">
+            <a:schemeClr val="accent1"/>
+          </a:fillRef>
+          <a:effectRef idx="0">
+            <a:schemeClr val="accent1"/>
+          </a:effectRef>
+          <a:fontRef idx="minor">
+            <a:schemeClr val="lt1"/>
+          </a:fontRef>
+        </p:style>
+        <p:txBody>
+          <a:bodyPr rtlCol="0" anchor="ctr"/>
+          <a:lstStyle/>
+          <a:p>
+            <a:pPr algn="ctr"/>
+            <a:r>
+              <a:rPr lang="en-US" sz="1400" dirty="0"/>
+              <a:t>PathwayMatcher</a:t>
+            </a:r>
+          </a:p>
+        </p:txBody>
+      </p:sp>
+    </p:spTree>
+    <p:extLst>
+      <p:ext uri="{BB962C8B-B14F-4D97-AF65-F5344CB8AC3E}">
+        <p14:creationId xmlns:p14="http://schemas.microsoft.com/office/powerpoint/2010/main" val="1244067992"/>
       </p:ext>
     </p:extLst>
   </p:cSld>

</xml_diff>